<commit_message>
Actualización del PowePoint y del programa de compresión sencillo
</commit_message>
<xml_diff>
--- a/Compresion-de-imagenes-y-videos-via-Wavelets.pptx
+++ b/Compresion-de-imagenes-y-videos-via-Wavelets.pptx
@@ -5,7 +5,7 @@
     <p:sldMasterId id="2147483648" r:id="rId1"/>
   </p:sldMasterIdLst>
   <p:notesMasterIdLst>
-    <p:notesMasterId r:id="rId10"/>
+    <p:notesMasterId r:id="rId11"/>
   </p:notesMasterIdLst>
   <p:sldIdLst>
     <p:sldId id="256" r:id="rId2"/>
@@ -16,6 +16,7 @@
     <p:sldId id="261" r:id="rId7"/>
     <p:sldId id="262" r:id="rId8"/>
     <p:sldId id="263" r:id="rId9"/>
+    <p:sldId id="265" r:id="rId10"/>
   </p:sldIdLst>
   <p:sldSz cx="14630400" cy="8229600"/>
   <p:notesSz cx="8229600" cy="14630400"/>
@@ -907,6 +908,90 @@
     <p:extLst>
       <p:ext uri="{BB962C8B-B14F-4D97-AF65-F5344CB8AC3E}">
         <p14:creationId xmlns:p14="http://schemas.microsoft.com/office/powerpoint/2010/main" val="1024086991"/>
+      </p:ext>
+    </p:extLst>
+  </p:cSld>
+  <p:clrMapOvr>
+    <a:masterClrMapping/>
+  </p:clrMapOvr>
+</p:notes>
+</file>
+
+<file path=ppt/notesSlides/notesSlide9.xml><?xml version="1.0" encoding="utf-8"?>
+<p:notes xmlns:a="http://schemas.openxmlformats.org/drawingml/2006/main" xmlns:r="http://schemas.openxmlformats.org/officeDocument/2006/relationships" xmlns:p="http://schemas.openxmlformats.org/presentationml/2006/main">
+  <p:cSld>
+    <p:spTree>
+      <p:nvGrpSpPr>
+        <p:cNvPr id="1" name=""/>
+        <p:cNvGrpSpPr/>
+        <p:nvPr/>
+      </p:nvGrpSpPr>
+      <p:grpSpPr>
+        <a:xfrm>
+          <a:off x="0" y="0"/>
+          <a:ext cx="0" cy="0"/>
+          <a:chOff x="0" y="0"/>
+          <a:chExt cx="0" cy="0"/>
+        </a:xfrm>
+      </p:grpSpPr>
+      <p:sp>
+        <p:nvSpPr>
+          <p:cNvPr id="2" name="Slide Image Placeholder 1"/>
+          <p:cNvSpPr>
+            <a:spLocks noGrp="1" noRot="1" noChangeAspect="1"/>
+          </p:cNvSpPr>
+          <p:nvPr>
+            <p:ph type="sldImg"/>
+          </p:nvPr>
+        </p:nvSpPr>
+        <p:spPr/>
+      </p:sp>
+      <p:sp>
+        <p:nvSpPr>
+          <p:cNvPr id="3" name="Notes Placeholder 2"/>
+          <p:cNvSpPr>
+            <a:spLocks noGrp="1"/>
+          </p:cNvSpPr>
+          <p:nvPr>
+            <p:ph type="body" idx="1"/>
+          </p:nvPr>
+        </p:nvSpPr>
+        <p:spPr/>
+        <p:txBody>
+          <a:bodyPr/>
+          <a:lstStyle/>
+          <a:p>
+            <a:endParaRPr lang="en-US" dirty="0"/>
+          </a:p>
+        </p:txBody>
+      </p:sp>
+      <p:sp>
+        <p:nvSpPr>
+          <p:cNvPr id="4" name="Slide Number Placeholder 3"/>
+          <p:cNvSpPr>
+            <a:spLocks noGrp="1"/>
+          </p:cNvSpPr>
+          <p:nvPr>
+            <p:ph type="sldNum" sz="quarter" idx="10"/>
+          </p:nvPr>
+        </p:nvSpPr>
+        <p:spPr/>
+        <p:txBody>
+          <a:bodyPr/>
+          <a:lstStyle/>
+          <a:p>
+            <a:fld id="{F7021451-1387-4CA6-816F-3879F97B5CBC}" type="slidenum">
+              <a:rPr lang="en-US"/>
+              <a:t>9</a:t>
+            </a:fld>
+            <a:endParaRPr lang="en-US"/>
+          </a:p>
+        </p:txBody>
+      </p:sp>
+    </p:spTree>
+    <p:extLst>
+      <p:ext uri="{BB962C8B-B14F-4D97-AF65-F5344CB8AC3E}">
+        <p14:creationId xmlns:p14="http://schemas.microsoft.com/office/powerpoint/2010/main" val="3102124038"/>
       </p:ext>
     </p:extLst>
   </p:cSld>
@@ -1383,152 +1468,55 @@
           </a:p>
         </p:txBody>
       </p:sp>
-      <p:sp>
-        <p:nvSpPr>
-          <p:cNvPr id="6" name="Shape 4"/>
-          <p:cNvSpPr/>
-          <p:nvPr/>
-        </p:nvSpPr>
-        <p:spPr>
-          <a:xfrm>
-            <a:off x="6319599" y="5772626"/>
-            <a:ext cx="355402" cy="355402"/>
-          </a:xfrm>
-          <a:prstGeom prst="roundRect">
-            <a:avLst>
-              <a:gd name="adj" fmla="val 25726039"/>
-            </a:avLst>
-          </a:prstGeom>
-          <a:noFill/>
-          <a:ln w="7620">
-            <a:solidFill>
-              <a:srgbClr val="FFFFFF"/>
-            </a:solidFill>
-            <a:prstDash val="solid"/>
-          </a:ln>
-        </p:spPr>
-        <p:txBody>
-          <a:bodyPr/>
-          <a:lstStyle/>
-          <a:p>
-            <a:endParaRPr lang="es-ES"/>
-          </a:p>
-        </p:txBody>
-      </p:sp>
       <p:pic>
         <p:nvPicPr>
-          <p:cNvPr id="7" name="Image 0" descr="preencoded.png"/>
-          <p:cNvPicPr>
-            <a:picLocks noChangeAspect="1"/>
-          </p:cNvPicPr>
-          <p:nvPr/>
-        </p:nvPicPr>
-        <p:blipFill>
-          <a:blip r:embed="rId3"/>
-          <a:stretch>
-            <a:fillRect/>
-          </a:stretch>
-        </p:blipFill>
-        <p:spPr>
-          <a:xfrm>
-            <a:off x="6327219" y="5780246"/>
-            <a:ext cx="340162" cy="340162"/>
-          </a:xfrm>
-          <a:prstGeom prst="rect">
-            <a:avLst/>
-          </a:prstGeom>
-        </p:spPr>
-      </p:pic>
-      <p:sp>
-        <p:nvSpPr>
-          <p:cNvPr id="8" name="Text 5"/>
-          <p:cNvSpPr/>
-          <p:nvPr/>
-        </p:nvSpPr>
-        <p:spPr>
-          <a:xfrm>
-            <a:off x="6786086" y="5755958"/>
-            <a:ext cx="2834640" cy="388858"/>
-          </a:xfrm>
-          <a:prstGeom prst="rect">
-            <a:avLst/>
-          </a:prstGeom>
-          <a:noFill/>
-          <a:ln/>
-        </p:spPr>
-        <p:txBody>
-          <a:bodyPr wrap="none" rtlCol="0" anchor="t"/>
-          <a:lstStyle/>
-          <a:p>
-            <a:pPr marL="0" indent="0" algn="l">
-              <a:lnSpc>
-                <a:spcPts val="3062"/>
-              </a:lnSpc>
-              <a:buNone/>
-            </a:pPr>
-            <a:r>
-              <a:rPr lang="en-US" sz="2187" b="1" dirty="0">
-                <a:solidFill>
-                  <a:srgbClr val="DAD1E6"/>
-                </a:solidFill>
-                <a:latin typeface="Fira Sans" pitchFamily="34" charset="0"/>
-                <a:ea typeface="Fira Sans" pitchFamily="34" charset="-122"/>
-                <a:cs typeface="Fira Sans" pitchFamily="34" charset="-120"/>
-              </a:rPr>
-              <a:t>by Jesús Martínez Leal</a:t>
-            </a:r>
-            <a:endParaRPr lang="en-US" sz="2187" dirty="0"/>
-          </a:p>
-        </p:txBody>
-      </p:sp>
-      <p:pic>
-        <p:nvPicPr>
-          <p:cNvPr id="9" name="Image 1" descr="preencoded.png"/>
-          <p:cNvPicPr>
-            <a:picLocks noChangeAspect="1"/>
-          </p:cNvPicPr>
-          <p:nvPr/>
-        </p:nvPicPr>
-        <p:blipFill>
-          <a:blip r:embed="rId4"/>
-          <a:stretch>
-            <a:fillRect/>
-          </a:stretch>
-        </p:blipFill>
-        <p:spPr>
-          <a:xfrm>
-            <a:off x="0" y="0"/>
-            <a:ext cx="5486400" cy="8229600"/>
-          </a:xfrm>
-          <a:prstGeom prst="rect">
-            <a:avLst/>
-          </a:prstGeom>
-        </p:spPr>
-      </p:pic>
-      <p:pic>
-        <p:nvPicPr>
-          <p:cNvPr id="10" name="Image 2" descr="preencoded.png">
-            <a:hlinkClick r:id="rId5"/>
+          <p:cNvPr id="1026" name="Picture 2" descr="Wavelet Compression for Images - MATLAB &amp; Simulink">
+            <a:extLst>
+              <a:ext uri="{FF2B5EF4-FFF2-40B4-BE49-F238E27FC236}">
+                <a16:creationId xmlns:a16="http://schemas.microsoft.com/office/drawing/2014/main" id="{E7FDC024-262C-4970-7B3C-A0B3F09DBDD2}"/>
+              </a:ext>
+            </a:extLst>
           </p:cNvPr>
           <p:cNvPicPr>
-            <a:picLocks noChangeAspect="1"/>
+            <a:picLocks noChangeAspect="1" noChangeArrowheads="1"/>
           </p:cNvPicPr>
           <p:nvPr/>
         </p:nvPicPr>
-        <p:blipFill>
-          <a:blip r:embed="rId6"/>
-          <a:stretch>
-            <a:fillRect/>
-          </a:stretch>
+        <p:blipFill rotWithShape="1">
+          <a:blip r:embed="rId3">
+            <a:alphaModFix amt="70000"/>
+            <a:extLst>
+              <a:ext uri="{28A0092B-C50C-407E-A947-70E740481C1C}">
+                <a14:useLocalDpi xmlns:a14="http://schemas.microsoft.com/office/drawing/2010/main" val="0"/>
+              </a:ext>
+            </a:extLst>
+          </a:blip>
+          <a:srcRect r="35864"/>
+          <a:stretch/>
         </p:blipFill>
-        <p:spPr>
-          <a:xfrm>
-            <a:off x="12242153" y="7589520"/>
-            <a:ext cx="2296807" cy="548640"/>
-          </a:xfrm>
-          <a:prstGeom prst="rect">
-            <a:avLst/>
-          </a:prstGeom>
+        <p:spPr bwMode="auto">
+          <a:xfrm>
+            <a:off x="614990" y="1305465"/>
+            <a:ext cx="5270356" cy="5229279"/>
+          </a:xfrm>
+          <a:prstGeom prst="rect">
+            <a:avLst/>
+          </a:prstGeom>
+          <a:noFill/>
+          <a:ln w="38100">
+            <a:solidFill>
+              <a:srgbClr val="FF726D"/>
+            </a:solidFill>
+          </a:ln>
+          <a:extLst>
+            <a:ext uri="{909E8E84-426E-40DD-AFC4-6F175D3DCCD1}">
+              <a14:hiddenFill xmlns:a14="http://schemas.microsoft.com/office/drawing/2010/main">
+                <a:solidFill>
+                  <a:srgbClr val="FFFFFF"/>
+                </a:solidFill>
+              </a14:hiddenFill>
+            </a:ext>
+          </a:extLst>
         </p:spPr>
       </p:pic>
     </p:spTree>
@@ -1845,7 +1833,7 @@
         <p:spPr>
           <a:xfrm>
             <a:off x="7648456" y="3106936"/>
-            <a:ext cx="4721781" cy="1066205"/>
+            <a:ext cx="4943951" cy="1066205"/>
           </a:xfrm>
           <a:prstGeom prst="rect">
             <a:avLst/>
@@ -2071,7 +2059,7 @@
         <p:spPr>
           <a:xfrm>
             <a:off x="7648456" y="5409009"/>
-            <a:ext cx="4721781" cy="1421606"/>
+            <a:ext cx="4943951" cy="1421606"/>
           </a:xfrm>
           <a:prstGeom prst="rect">
             <a:avLst/>
@@ -2104,32 +2092,6 @@
           </a:p>
         </p:txBody>
       </p:sp>
-      <p:pic>
-        <p:nvPicPr>
-          <p:cNvPr id="17" name="Image 0" descr="preencoded.png">
-            <a:hlinkClick r:id="rId3"/>
-          </p:cNvPr>
-          <p:cNvPicPr>
-            <a:picLocks noChangeAspect="1"/>
-          </p:cNvPicPr>
-          <p:nvPr/>
-        </p:nvPicPr>
-        <p:blipFill>
-          <a:blip r:embed="rId4"/>
-          <a:stretch>
-            <a:fillRect/>
-          </a:stretch>
-        </p:blipFill>
-        <p:spPr>
-          <a:xfrm>
-            <a:off x="12242153" y="7589520"/>
-            <a:ext cx="2296807" cy="548640"/>
-          </a:xfrm>
-          <a:prstGeom prst="rect">
-            <a:avLst/>
-          </a:prstGeom>
-        </p:spPr>
-      </p:pic>
     </p:spTree>
   </p:cSld>
   <p:clrMapOvr>
@@ -2259,7 +2221,7 @@
         </p:nvSpPr>
         <p:spPr>
           <a:xfrm>
-            <a:off x="2180630" y="2546985"/>
+            <a:off x="2180630" y="2380731"/>
             <a:ext cx="486370" cy="486370"/>
           </a:xfrm>
           <a:prstGeom prst="roundRect">
@@ -2288,7 +2250,7 @@
         </p:nvSpPr>
         <p:spPr>
           <a:xfrm>
-            <a:off x="2339935" y="2587466"/>
+            <a:off x="2339935" y="2421212"/>
             <a:ext cx="167640" cy="405408"/>
           </a:xfrm>
           <a:prstGeom prst="rect">
@@ -2330,7 +2292,7 @@
         </p:nvSpPr>
         <p:spPr>
           <a:xfrm>
-            <a:off x="2883098" y="2621280"/>
+            <a:off x="2883098" y="2455026"/>
             <a:ext cx="4324112" cy="675561"/>
           </a:xfrm>
           <a:prstGeom prst="rect">
@@ -2372,7 +2334,7 @@
         </p:nvSpPr>
         <p:spPr>
           <a:xfrm>
-            <a:off x="2883098" y="3512939"/>
+            <a:off x="2883098" y="3346685"/>
             <a:ext cx="4324112" cy="1383506"/>
           </a:xfrm>
           <a:prstGeom prst="rect">
@@ -2414,7 +2376,7 @@
         </p:nvSpPr>
         <p:spPr>
           <a:xfrm>
-            <a:off x="7423309" y="2546985"/>
+            <a:off x="7423309" y="2380731"/>
             <a:ext cx="486370" cy="486370"/>
           </a:xfrm>
           <a:prstGeom prst="roundRect">
@@ -2443,7 +2405,7 @@
         </p:nvSpPr>
         <p:spPr>
           <a:xfrm>
-            <a:off x="7582614" y="2587466"/>
+            <a:off x="7582614" y="2421212"/>
             <a:ext cx="167640" cy="405408"/>
           </a:xfrm>
           <a:prstGeom prst="rect">
@@ -2485,7 +2447,7 @@
         </p:nvSpPr>
         <p:spPr>
           <a:xfrm>
-            <a:off x="8125778" y="2621280"/>
+            <a:off x="8125778" y="2455026"/>
             <a:ext cx="4324112" cy="675561"/>
           </a:xfrm>
           <a:prstGeom prst="rect">
@@ -2527,8 +2489,8 @@
         </p:nvSpPr>
         <p:spPr>
           <a:xfrm>
-            <a:off x="8125778" y="3512939"/>
-            <a:ext cx="4324112" cy="1383506"/>
+            <a:off x="8125778" y="3346685"/>
+            <a:ext cx="4603086" cy="1383506"/>
           </a:xfrm>
           <a:prstGeom prst="rect">
             <a:avLst/>
@@ -2569,7 +2531,7 @@
         </p:nvSpPr>
         <p:spPr>
           <a:xfrm>
-            <a:off x="2180630" y="5281374"/>
+            <a:off x="2180630" y="5115120"/>
             <a:ext cx="486370" cy="486370"/>
           </a:xfrm>
           <a:prstGeom prst="roundRect">
@@ -2598,7 +2560,7 @@
         </p:nvSpPr>
         <p:spPr>
           <a:xfrm>
-            <a:off x="2339935" y="5321856"/>
+            <a:off x="2339935" y="5155602"/>
             <a:ext cx="167640" cy="405408"/>
           </a:xfrm>
           <a:prstGeom prst="rect">
@@ -2640,7 +2602,7 @@
         </p:nvSpPr>
         <p:spPr>
           <a:xfrm>
-            <a:off x="2883098" y="5355669"/>
+            <a:off x="2883098" y="5189415"/>
             <a:ext cx="3154680" cy="337780"/>
           </a:xfrm>
           <a:prstGeom prst="rect">
@@ -2682,7 +2644,7 @@
         </p:nvSpPr>
         <p:spPr>
           <a:xfrm>
-            <a:off x="2883098" y="5909548"/>
+            <a:off x="2883098" y="5743294"/>
             <a:ext cx="4324112" cy="1383506"/>
           </a:xfrm>
           <a:prstGeom prst="rect">
@@ -2724,7 +2686,7 @@
         </p:nvSpPr>
         <p:spPr>
           <a:xfrm>
-            <a:off x="7423309" y="5281374"/>
+            <a:off x="7423309" y="5115120"/>
             <a:ext cx="486370" cy="486370"/>
           </a:xfrm>
           <a:prstGeom prst="roundRect">
@@ -2753,7 +2715,7 @@
         </p:nvSpPr>
         <p:spPr>
           <a:xfrm>
-            <a:off x="7582614" y="5321856"/>
+            <a:off x="7582614" y="5155602"/>
             <a:ext cx="167640" cy="405408"/>
           </a:xfrm>
           <a:prstGeom prst="rect">
@@ -2795,7 +2757,7 @@
         </p:nvSpPr>
         <p:spPr>
           <a:xfrm>
-            <a:off x="8125778" y="5355669"/>
+            <a:off x="8125778" y="5189415"/>
             <a:ext cx="3429000" cy="337780"/>
           </a:xfrm>
           <a:prstGeom prst="rect">
@@ -2837,7 +2799,7 @@
         </p:nvSpPr>
         <p:spPr>
           <a:xfrm>
-            <a:off x="8125778" y="5909548"/>
+            <a:off x="8125778" y="5743294"/>
             <a:ext cx="4324112" cy="1729383"/>
           </a:xfrm>
           <a:prstGeom prst="rect">
@@ -2871,32 +2833,6 @@
           </a:p>
         </p:txBody>
       </p:sp>
-      <p:pic>
-        <p:nvPicPr>
-          <p:cNvPr id="21" name="Image 0" descr="preencoded.png">
-            <a:hlinkClick r:id="rId3"/>
-          </p:cNvPr>
-          <p:cNvPicPr>
-            <a:picLocks noChangeAspect="1"/>
-          </p:cNvPicPr>
-          <p:nvPr/>
-        </p:nvPicPr>
-        <p:blipFill>
-          <a:blip r:embed="rId4"/>
-          <a:stretch>
-            <a:fillRect/>
-          </a:stretch>
-        </p:blipFill>
-        <p:spPr>
-          <a:xfrm>
-            <a:off x="12242153" y="7589520"/>
-            <a:ext cx="2296807" cy="548640"/>
-          </a:xfrm>
-          <a:prstGeom prst="rect">
-            <a:avLst/>
-          </a:prstGeom>
-        </p:spPr>
-      </p:pic>
     </p:spTree>
   </p:cSld>
   <p:clrMapOvr>
@@ -2984,8 +2920,8 @@
         </p:nvSpPr>
         <p:spPr>
           <a:xfrm>
-            <a:off x="2624376" y="543044"/>
-            <a:ext cx="9381649" cy="1234202"/>
+            <a:off x="1764383" y="515711"/>
+            <a:ext cx="11126400" cy="1234202"/>
           </a:xfrm>
           <a:prstGeom prst="rect">
             <a:avLst/>
@@ -3004,7 +2940,7 @@
               <a:buNone/>
             </a:pPr>
             <a:r>
-              <a:rPr lang="en-US" sz="3888" b="1" dirty="0">
+              <a:rPr lang="en-US" sz="4200" b="1" dirty="0">
                 <a:solidFill>
                   <a:srgbClr val="FF726D"/>
                 </a:solidFill>
@@ -3014,7 +2950,7 @@
               </a:rPr>
               <a:t>Proceso de compresión utilizando Wavelets</a:t>
             </a:r>
-            <a:endParaRPr lang="en-US" sz="3888" dirty="0"/>
+            <a:endParaRPr lang="en-US" sz="4200" dirty="0"/>
           </a:p>
         </p:txBody>
       </p:sp>
@@ -3026,7 +2962,7 @@
         </p:nvSpPr>
         <p:spPr>
           <a:xfrm>
-            <a:off x="7302937" y="2172176"/>
+            <a:off x="7302937" y="1933183"/>
             <a:ext cx="24646" cy="5514380"/>
           </a:xfrm>
           <a:prstGeom prst="rect">
@@ -3053,7 +2989,7 @@
         </p:nvSpPr>
         <p:spPr>
           <a:xfrm>
-            <a:off x="7537371" y="2536329"/>
+            <a:off x="7537371" y="2297336"/>
             <a:ext cx="691277" cy="24646"/>
           </a:xfrm>
           <a:prstGeom prst="rect">
@@ -3080,7 +3016,7 @@
         </p:nvSpPr>
         <p:spPr>
           <a:xfrm>
-            <a:off x="7093029" y="2326481"/>
+            <a:off x="7093029" y="2087488"/>
             <a:ext cx="444341" cy="444341"/>
           </a:xfrm>
           <a:prstGeom prst="roundRect">
@@ -3109,7 +3045,7 @@
         </p:nvSpPr>
         <p:spPr>
           <a:xfrm>
-            <a:off x="7239000" y="2363510"/>
+            <a:off x="7239000" y="2124517"/>
             <a:ext cx="152400" cy="370284"/>
           </a:xfrm>
           <a:prstGeom prst="rect">
@@ -3151,7 +3087,7 @@
         </p:nvSpPr>
         <p:spPr>
           <a:xfrm>
-            <a:off x="8401407" y="2369582"/>
+            <a:off x="8401407" y="2130589"/>
             <a:ext cx="1975009" cy="308610"/>
           </a:xfrm>
           <a:prstGeom prst="rect">
@@ -3193,7 +3129,7 @@
         </p:nvSpPr>
         <p:spPr>
           <a:xfrm>
-            <a:off x="8401407" y="2875597"/>
+            <a:off x="8401407" y="2636604"/>
             <a:ext cx="3604617" cy="947976"/>
           </a:xfrm>
           <a:prstGeom prst="rect">
@@ -3235,7 +3171,7 @@
         </p:nvSpPr>
         <p:spPr>
           <a:xfrm>
-            <a:off x="6401753" y="3523714"/>
+            <a:off x="6401753" y="3284721"/>
             <a:ext cx="691277" cy="24646"/>
           </a:xfrm>
           <a:prstGeom prst="rect">
@@ -3262,7 +3198,7 @@
         </p:nvSpPr>
         <p:spPr>
           <a:xfrm>
-            <a:off x="7093029" y="3313867"/>
+            <a:off x="7093029" y="3074874"/>
             <a:ext cx="444341" cy="444341"/>
           </a:xfrm>
           <a:prstGeom prst="roundRect">
@@ -3291,7 +3227,7 @@
         </p:nvSpPr>
         <p:spPr>
           <a:xfrm>
-            <a:off x="7239000" y="3350895"/>
+            <a:off x="7239000" y="3111902"/>
             <a:ext cx="152400" cy="370284"/>
           </a:xfrm>
           <a:prstGeom prst="rect">
@@ -3333,7 +3269,7 @@
         </p:nvSpPr>
         <p:spPr>
           <a:xfrm>
-            <a:off x="4253984" y="3356967"/>
+            <a:off x="4253984" y="3117974"/>
             <a:ext cx="1975009" cy="308610"/>
           </a:xfrm>
           <a:prstGeom prst="rect">
@@ -3375,7 +3311,7 @@
         </p:nvSpPr>
         <p:spPr>
           <a:xfrm>
-            <a:off x="2624376" y="3862983"/>
+            <a:off x="2624376" y="3623990"/>
             <a:ext cx="3604617" cy="1263968"/>
           </a:xfrm>
           <a:prstGeom prst="rect">
@@ -3417,7 +3353,7 @@
         </p:nvSpPr>
         <p:spPr>
           <a:xfrm>
-            <a:off x="7537371" y="4704814"/>
+            <a:off x="7537371" y="4465821"/>
             <a:ext cx="691277" cy="24646"/>
           </a:xfrm>
           <a:prstGeom prst="rect">
@@ -3444,7 +3380,7 @@
         </p:nvSpPr>
         <p:spPr>
           <a:xfrm>
-            <a:off x="7093029" y="4494967"/>
+            <a:off x="7093029" y="4255974"/>
             <a:ext cx="444341" cy="444341"/>
           </a:xfrm>
           <a:prstGeom prst="roundRect">
@@ -3473,7 +3409,7 @@
         </p:nvSpPr>
         <p:spPr>
           <a:xfrm>
-            <a:off x="7239000" y="4531995"/>
+            <a:off x="7239000" y="4293002"/>
             <a:ext cx="152400" cy="370284"/>
           </a:xfrm>
           <a:prstGeom prst="rect">
@@ -3515,7 +3451,7 @@
         </p:nvSpPr>
         <p:spPr>
           <a:xfrm>
-            <a:off x="8401407" y="4538067"/>
+            <a:off x="8401407" y="4299074"/>
             <a:ext cx="1975009" cy="308610"/>
           </a:xfrm>
           <a:prstGeom prst="rect">
@@ -3557,7 +3493,7 @@
         </p:nvSpPr>
         <p:spPr>
           <a:xfrm>
-            <a:off x="8401407" y="5044083"/>
+            <a:off x="8401407" y="4805090"/>
             <a:ext cx="3604617" cy="1263968"/>
           </a:xfrm>
           <a:prstGeom prst="rect">
@@ -3599,7 +3535,7 @@
         </p:nvSpPr>
         <p:spPr>
           <a:xfrm>
-            <a:off x="6401753" y="5885914"/>
+            <a:off x="6401753" y="5646921"/>
             <a:ext cx="691277" cy="24646"/>
           </a:xfrm>
           <a:prstGeom prst="rect">
@@ -3626,7 +3562,7 @@
         </p:nvSpPr>
         <p:spPr>
           <a:xfrm>
-            <a:off x="7093029" y="5676067"/>
+            <a:off x="7093029" y="5437074"/>
             <a:ext cx="444341" cy="444341"/>
           </a:xfrm>
           <a:prstGeom prst="roundRect">
@@ -3655,7 +3591,7 @@
         </p:nvSpPr>
         <p:spPr>
           <a:xfrm>
-            <a:off x="7239000" y="5713095"/>
+            <a:off x="7239000" y="5474102"/>
             <a:ext cx="152400" cy="370284"/>
           </a:xfrm>
           <a:prstGeom prst="rect">
@@ -3697,7 +3633,7 @@
         </p:nvSpPr>
         <p:spPr>
           <a:xfrm>
-            <a:off x="4253984" y="5719167"/>
+            <a:off x="4253984" y="5480174"/>
             <a:ext cx="1975009" cy="308610"/>
           </a:xfrm>
           <a:prstGeom prst="rect">
@@ -3739,7 +3675,7 @@
         </p:nvSpPr>
         <p:spPr>
           <a:xfrm>
-            <a:off x="2624376" y="6225183"/>
+            <a:off x="2624376" y="5986190"/>
             <a:ext cx="3604617" cy="1263968"/>
           </a:xfrm>
           <a:prstGeom prst="rect">
@@ -3773,32 +3709,6 @@
           </a:p>
         </p:txBody>
       </p:sp>
-      <p:pic>
-        <p:nvPicPr>
-          <p:cNvPr id="26" name="Image 0" descr="preencoded.png">
-            <a:hlinkClick r:id="rId3"/>
-          </p:cNvPr>
-          <p:cNvPicPr>
-            <a:picLocks noChangeAspect="1"/>
-          </p:cNvPicPr>
-          <p:nvPr/>
-        </p:nvPicPr>
-        <p:blipFill>
-          <a:blip r:embed="rId4"/>
-          <a:stretch>
-            <a:fillRect/>
-          </a:stretch>
-        </p:blipFill>
-        <p:spPr>
-          <a:xfrm>
-            <a:off x="12242153" y="7589520"/>
-            <a:ext cx="2296807" cy="548640"/>
-          </a:xfrm>
-          <a:prstGeom prst="rect">
-            <a:avLst/>
-          </a:prstGeom>
-        </p:spPr>
-      </p:pic>
     </p:spTree>
   </p:cSld>
   <p:clrMapOvr>
@@ -3808,7 +3718,7 @@
 </file>
 
 <file path=ppt/slides/slide5.xml><?xml version="1.0" encoding="utf-8"?>
-<p:sld xmlns:a="http://schemas.openxmlformats.org/drawingml/2006/main" xmlns:r="http://schemas.openxmlformats.org/officeDocument/2006/relationships" xmlns:p="http://schemas.openxmlformats.org/presentationml/2006/main">
+<p:sld xmlns:a="http://schemas.openxmlformats.org/drawingml/2006/main" xmlns:r="http://schemas.openxmlformats.org/officeDocument/2006/relationships" xmlns:p="http://schemas.openxmlformats.org/presentationml/2006/main" show="0">
   <p:cSld name="Slide 5">
     <p:spTree>
       <p:nvGrpSpPr>
@@ -3886,8 +3796,8 @@
         </p:nvSpPr>
         <p:spPr>
           <a:xfrm>
-            <a:off x="3621167" y="427673"/>
-            <a:ext cx="7388066" cy="972026"/>
+            <a:off x="1223496" y="421839"/>
+            <a:ext cx="12183407" cy="972026"/>
           </a:xfrm>
           <a:prstGeom prst="rect">
             <a:avLst/>
@@ -3936,7 +3846,7 @@
         </p:blipFill>
         <p:spPr>
           <a:xfrm>
-            <a:off x="3621167" y="1710690"/>
+            <a:off x="3621167" y="1482088"/>
             <a:ext cx="3577352" cy="2210872"/>
           </a:xfrm>
           <a:prstGeom prst="rect">
@@ -3952,7 +3862,7 @@
         </p:nvSpPr>
         <p:spPr>
           <a:xfrm>
-            <a:off x="3621167" y="4115872"/>
+            <a:off x="3621167" y="3887270"/>
             <a:ext cx="1981200" cy="243007"/>
           </a:xfrm>
           <a:prstGeom prst="rect">
@@ -3994,7 +3904,7 @@
         </p:nvSpPr>
         <p:spPr>
           <a:xfrm>
-            <a:off x="3621167" y="4514374"/>
+            <a:off x="3621167" y="4285772"/>
             <a:ext cx="3577352" cy="746165"/>
           </a:xfrm>
           <a:prstGeom prst="rect">
@@ -4044,7 +3954,7 @@
         </p:blipFill>
         <p:spPr>
           <a:xfrm>
-            <a:off x="7431762" y="1710690"/>
+            <a:off x="7431762" y="1482088"/>
             <a:ext cx="3577471" cy="2210991"/>
           </a:xfrm>
           <a:prstGeom prst="rect">
@@ -4060,7 +3970,7 @@
         </p:nvSpPr>
         <p:spPr>
           <a:xfrm>
-            <a:off x="7431762" y="4115991"/>
+            <a:off x="7431762" y="3887389"/>
             <a:ext cx="2773680" cy="243007"/>
           </a:xfrm>
           <a:prstGeom prst="rect">
@@ -4102,7 +4012,7 @@
         </p:nvSpPr>
         <p:spPr>
           <a:xfrm>
-            <a:off x="7431762" y="4514493"/>
+            <a:off x="7431762" y="4285891"/>
             <a:ext cx="3577471" cy="994886"/>
           </a:xfrm>
           <a:prstGeom prst="rect">
@@ -4152,7 +4062,7 @@
         </p:blipFill>
         <p:spPr>
           <a:xfrm>
-            <a:off x="3621167" y="5742623"/>
+            <a:off x="3621167" y="5514021"/>
             <a:ext cx="3577352" cy="2210872"/>
           </a:xfrm>
           <a:prstGeom prst="rect">
@@ -4168,7 +4078,7 @@
         </p:nvSpPr>
         <p:spPr>
           <a:xfrm>
-            <a:off x="3621167" y="8147804"/>
+            <a:off x="3621167" y="7919202"/>
             <a:ext cx="1981200" cy="243007"/>
           </a:xfrm>
           <a:prstGeom prst="rect">
@@ -4260,7 +4170,7 @@
         </p:blipFill>
         <p:spPr>
           <a:xfrm>
-            <a:off x="7431762" y="5742623"/>
+            <a:off x="7431762" y="5514021"/>
             <a:ext cx="3577471" cy="2210991"/>
           </a:xfrm>
           <a:prstGeom prst="rect">
@@ -4276,7 +4186,7 @@
         </p:nvSpPr>
         <p:spPr>
           <a:xfrm>
-            <a:off x="7431762" y="8147923"/>
+            <a:off x="7431762" y="7919321"/>
             <a:ext cx="2476500" cy="243007"/>
           </a:xfrm>
           <a:prstGeom prst="rect">
@@ -4352,32 +4262,6 @@
           </a:p>
         </p:txBody>
       </p:sp>
-      <p:pic>
-        <p:nvPicPr>
-          <p:cNvPr id="17" name="Image 4" descr="preencoded.png">
-            <a:hlinkClick r:id="rId7"/>
-          </p:cNvPr>
-          <p:cNvPicPr>
-            <a:picLocks noChangeAspect="1"/>
-          </p:cNvPicPr>
-          <p:nvPr/>
-        </p:nvPicPr>
-        <p:blipFill>
-          <a:blip r:embed="rId8"/>
-          <a:stretch>
-            <a:fillRect/>
-          </a:stretch>
-        </p:blipFill>
-        <p:spPr>
-          <a:xfrm>
-            <a:off x="12242153" y="7589520"/>
-            <a:ext cx="2296807" cy="548640"/>
-          </a:xfrm>
-          <a:prstGeom prst="rect">
-            <a:avLst/>
-          </a:prstGeom>
-        </p:spPr>
-      </p:pic>
     </p:spTree>
   </p:cSld>
   <p:clrMapOvr>
@@ -4453,7 +4337,7 @@
           <a:bodyPr/>
           <a:lstStyle/>
           <a:p>
-            <a:endParaRPr lang="es-ES"/>
+            <a:endParaRPr lang="es-ES" dirty="0"/>
           </a:p>
         </p:txBody>
       </p:sp>
@@ -4465,8 +4349,8 @@
         </p:nvSpPr>
         <p:spPr>
           <a:xfrm>
-            <a:off x="2194441" y="592812"/>
-            <a:ext cx="10241518" cy="1347311"/>
+            <a:off x="7770498" y="652969"/>
+            <a:ext cx="6093779" cy="809961"/>
           </a:xfrm>
           <a:prstGeom prst="rect">
             <a:avLst/>
@@ -4485,7 +4369,7 @@
               <a:buNone/>
             </a:pPr>
             <a:r>
-              <a:rPr lang="en-US" sz="4244" b="1" dirty="0">
+              <a:rPr lang="en-US" sz="4244" b="1" dirty="0" err="1">
                 <a:solidFill>
                   <a:srgbClr val="FF726D"/>
                 </a:solidFill>
@@ -4493,7 +4377,29 @@
                 <a:ea typeface="Inconsolata" pitchFamily="34" charset="-122"/>
                 <a:cs typeface="Inconsolata" pitchFamily="34" charset="-120"/>
               </a:rPr>
-              <a:t>Ejemplos de compresión de imágenes y vídeos utilizando Wavelets</a:t>
+              <a:t>Compresión</a:t>
+            </a:r>
+            <a:r>
+              <a:rPr lang="en-US" sz="4244" b="1" dirty="0">
+                <a:solidFill>
+                  <a:srgbClr val="FF726D"/>
+                </a:solidFill>
+                <a:latin typeface="Inconsolata" pitchFamily="34" charset="0"/>
+                <a:ea typeface="Inconsolata" pitchFamily="34" charset="-122"/>
+                <a:cs typeface="Inconsolata" pitchFamily="34" charset="-120"/>
+              </a:rPr>
+              <a:t> de </a:t>
+            </a:r>
+            <a:r>
+              <a:rPr lang="en-US" sz="4244" b="1" dirty="0" err="1">
+                <a:solidFill>
+                  <a:srgbClr val="FF726D"/>
+                </a:solidFill>
+                <a:latin typeface="Inconsolata" pitchFamily="34" charset="0"/>
+                <a:ea typeface="Inconsolata" pitchFamily="34" charset="-122"/>
+                <a:cs typeface="Inconsolata" pitchFamily="34" charset="-120"/>
+              </a:rPr>
+              <a:t>imágenes</a:t>
             </a:r>
             <a:endParaRPr lang="en-US" sz="4244" dirty="0"/>
           </a:p>
@@ -4501,7 +4407,13 @@
       </p:sp>
       <p:pic>
         <p:nvPicPr>
-          <p:cNvPr id="5" name="Image 0" descr="preencoded.png"/>
+          <p:cNvPr id="20" name="Imagen 19" descr="Imagen en blanco y negro de una mujer con un sombrero en la cabeza&#10;&#10;Descripción generada automáticamente">
+            <a:extLst>
+              <a:ext uri="{FF2B5EF4-FFF2-40B4-BE49-F238E27FC236}">
+                <a16:creationId xmlns:a16="http://schemas.microsoft.com/office/drawing/2014/main" id="{796D9849-AD5A-1CB8-959F-170D7AF13568}"/>
+              </a:ext>
+            </a:extLst>
+          </p:cNvPr>
           <p:cNvPicPr>
             <a:picLocks noChangeAspect="1"/>
           </p:cNvPicPr>
@@ -4515,101 +4427,28 @@
         </p:blipFill>
         <p:spPr>
           <a:xfrm>
-            <a:off x="2194441" y="2371249"/>
-            <a:ext cx="4959072" cy="3064907"/>
-          </a:xfrm>
-          <a:prstGeom prst="rect">
-            <a:avLst/>
-          </a:prstGeom>
+            <a:off x="626917" y="1219247"/>
+            <a:ext cx="2947505" cy="2947505"/>
+          </a:xfrm>
+          <a:prstGeom prst="rect">
+            <a:avLst/>
+          </a:prstGeom>
+          <a:ln w="19050">
+            <a:solidFill>
+              <a:srgbClr val="FF726D"/>
+            </a:solidFill>
+          </a:ln>
         </p:spPr>
       </p:pic>
-      <p:sp>
-        <p:nvSpPr>
-          <p:cNvPr id="6" name="Text 3"/>
-          <p:cNvSpPr/>
-          <p:nvPr/>
-        </p:nvSpPr>
-        <p:spPr>
-          <a:xfrm>
-            <a:off x="2194441" y="5705594"/>
-            <a:ext cx="2743200" cy="336947"/>
-          </a:xfrm>
-          <a:prstGeom prst="rect">
-            <a:avLst/>
-          </a:prstGeom>
-          <a:noFill/>
-          <a:ln/>
-        </p:spPr>
-        <p:txBody>
-          <a:bodyPr wrap="none" rtlCol="0" anchor="t"/>
-          <a:lstStyle/>
-          <a:p>
-            <a:pPr marL="0" indent="0" algn="l">
-              <a:lnSpc>
-                <a:spcPts val="2653"/>
-              </a:lnSpc>
-              <a:buNone/>
-            </a:pPr>
-            <a:r>
-              <a:rPr lang="en-US" sz="2122" b="1" dirty="0">
-                <a:solidFill>
-                  <a:srgbClr val="FF726D"/>
-                </a:solidFill>
-                <a:latin typeface="Inconsolata" pitchFamily="34" charset="0"/>
-                <a:ea typeface="Inconsolata" pitchFamily="34" charset="-122"/>
-                <a:cs typeface="Inconsolata" pitchFamily="34" charset="-120"/>
-              </a:rPr>
-              <a:t>Compresión de Imagen</a:t>
-            </a:r>
-            <a:endParaRPr lang="en-US" sz="2122" dirty="0"/>
-          </a:p>
-        </p:txBody>
-      </p:sp>
-      <p:sp>
-        <p:nvSpPr>
-          <p:cNvPr id="7" name="Text 4"/>
-          <p:cNvSpPr/>
-          <p:nvPr/>
-        </p:nvSpPr>
-        <p:spPr>
-          <a:xfrm>
-            <a:off x="2194441" y="6258044"/>
-            <a:ext cx="4959072" cy="1379696"/>
-          </a:xfrm>
-          <a:prstGeom prst="rect">
-            <a:avLst/>
-          </a:prstGeom>
-          <a:noFill/>
-          <a:ln/>
-        </p:spPr>
-        <p:txBody>
-          <a:bodyPr wrap="square" rtlCol="0" anchor="t"/>
-          <a:lstStyle/>
-          <a:p>
-            <a:pPr marL="0" indent="0" algn="l">
-              <a:lnSpc>
-                <a:spcPts val="2716"/>
-              </a:lnSpc>
-              <a:buNone/>
-            </a:pPr>
-            <a:r>
-              <a:rPr lang="en-US" sz="1698" dirty="0">
-                <a:solidFill>
-                  <a:srgbClr val="DAD1E6"/>
-                </a:solidFill>
-                <a:latin typeface="Fira Sans" pitchFamily="34" charset="0"/>
-                <a:ea typeface="Fira Sans" pitchFamily="34" charset="-122"/>
-                <a:cs typeface="Fira Sans" pitchFamily="34" charset="-120"/>
-              </a:rPr>
-              <a:t>Un ejemplo es la compresión JPEG2000, que utiliza el estándar de compresión basado en Wavelets para comprimir imágenes con mayor calidad y menor tamaño de archivo.</a:t>
-            </a:r>
-            <a:endParaRPr lang="en-US" sz="1698" dirty="0"/>
-          </a:p>
-        </p:txBody>
-      </p:sp>
       <p:pic>
         <p:nvPicPr>
-          <p:cNvPr id="8" name="Image 1" descr="preencoded.png"/>
+          <p:cNvPr id="22" name="Imagen 21" descr="Imagen en blanco y negro de una mujer con un sombrero&#10;&#10;Descripción generada automáticamente">
+            <a:extLst>
+              <a:ext uri="{FF2B5EF4-FFF2-40B4-BE49-F238E27FC236}">
+                <a16:creationId xmlns:a16="http://schemas.microsoft.com/office/drawing/2014/main" id="{DD355F6F-0A45-ACB9-52D2-B684743A31F0}"/>
+              </a:ext>
+            </a:extLst>
+          </p:cNvPr>
           <p:cNvPicPr>
             <a:picLocks noChangeAspect="1"/>
           </p:cNvPicPr>
@@ -4623,102 +4462,227 @@
         </p:blipFill>
         <p:spPr>
           <a:xfrm>
-            <a:off x="7476887" y="2371249"/>
-            <a:ext cx="4959072" cy="3064907"/>
-          </a:xfrm>
-          <a:prstGeom prst="rect">
-            <a:avLst/>
-          </a:prstGeom>
+            <a:off x="4056869" y="1219247"/>
+            <a:ext cx="2947505" cy="2947505"/>
+          </a:xfrm>
+          <a:prstGeom prst="rect">
+            <a:avLst/>
+          </a:prstGeom>
+          <a:ln w="19050">
+            <a:solidFill>
+              <a:srgbClr val="FF726D"/>
+            </a:solidFill>
+          </a:ln>
         </p:spPr>
       </p:pic>
       <p:sp>
         <p:nvSpPr>
-          <p:cNvPr id="9" name="Text 5"/>
-          <p:cNvSpPr/>
-          <p:nvPr/>
-        </p:nvSpPr>
-        <p:spPr>
-          <a:xfrm>
-            <a:off x="7476887" y="5705594"/>
-            <a:ext cx="2606040" cy="336947"/>
+          <p:cNvPr id="23" name="CuadroTexto 22">
+            <a:extLst>
+              <a:ext uri="{FF2B5EF4-FFF2-40B4-BE49-F238E27FC236}">
+                <a16:creationId xmlns:a16="http://schemas.microsoft.com/office/drawing/2014/main" id="{AA07AC38-560C-4248-84F2-3208824A7D01}"/>
+              </a:ext>
+            </a:extLst>
+          </p:cNvPr>
+          <p:cNvSpPr txBox="1"/>
+          <p:nvPr/>
+        </p:nvSpPr>
+        <p:spPr>
+          <a:xfrm>
+            <a:off x="1111827" y="4165859"/>
+            <a:ext cx="2556793" cy="380616"/>
           </a:xfrm>
           <a:prstGeom prst="rect">
             <a:avLst/>
           </a:prstGeom>
           <a:noFill/>
-          <a:ln/>
-        </p:spPr>
-        <p:txBody>
-          <a:bodyPr wrap="none" rtlCol="0" anchor="t"/>
-          <a:lstStyle/>
-          <a:p>
-            <a:pPr marL="0" indent="0" algn="l">
-              <a:lnSpc>
-                <a:spcPts val="2653"/>
-              </a:lnSpc>
-              <a:buNone/>
-            </a:pPr>
-            <a:r>
-              <a:rPr lang="en-US" sz="2122" b="1" dirty="0">
+        </p:spPr>
+        <p:txBody>
+          <a:bodyPr wrap="square" rtlCol="0">
+            <a:spAutoFit/>
+          </a:bodyPr>
+          <a:lstStyle/>
+          <a:p>
+            <a:r>
+              <a:rPr lang="es-ES" dirty="0">
                 <a:solidFill>
                   <a:srgbClr val="FF726D"/>
                 </a:solidFill>
-                <a:latin typeface="Inconsolata" pitchFamily="34" charset="0"/>
-                <a:ea typeface="Inconsolata" pitchFamily="34" charset="-122"/>
-                <a:cs typeface="Inconsolata" pitchFamily="34" charset="-120"/>
-              </a:rPr>
-              <a:t>Compresión de Video</a:t>
-            </a:r>
-            <a:endParaRPr lang="en-US" sz="2122" dirty="0"/>
-          </a:p>
-        </p:txBody>
-      </p:sp>
-      <p:sp>
-        <p:nvSpPr>
-          <p:cNvPr id="10" name="Text 6"/>
-          <p:cNvSpPr/>
-          <p:nvPr/>
-        </p:nvSpPr>
-        <p:spPr>
-          <a:xfrm>
-            <a:off x="7476887" y="6258044"/>
-            <a:ext cx="4959072" cy="1379696"/>
+              </a:rPr>
+              <a:t>Imagen original – 257kB</a:t>
+            </a:r>
+          </a:p>
+        </p:txBody>
+      </p:sp>
+      <p:sp>
+        <p:nvSpPr>
+          <p:cNvPr id="24" name="CuadroTexto 23">
+            <a:extLst>
+              <a:ext uri="{FF2B5EF4-FFF2-40B4-BE49-F238E27FC236}">
+                <a16:creationId xmlns:a16="http://schemas.microsoft.com/office/drawing/2014/main" id="{019160D0-1897-0D10-691A-4B32AE9BE294}"/>
+              </a:ext>
+            </a:extLst>
+          </p:cNvPr>
+          <p:cNvSpPr txBox="1"/>
+          <p:nvPr/>
+        </p:nvSpPr>
+        <p:spPr>
+          <a:xfrm>
+            <a:off x="4738254" y="4165859"/>
+            <a:ext cx="2447529" cy="380616"/>
           </a:xfrm>
           <a:prstGeom prst="rect">
             <a:avLst/>
           </a:prstGeom>
           <a:noFill/>
-          <a:ln/>
-        </p:spPr>
-        <p:txBody>
-          <a:bodyPr wrap="square" rtlCol="0" anchor="t"/>
-          <a:lstStyle/>
-          <a:p>
-            <a:pPr marL="0" indent="0" algn="l">
-              <a:lnSpc>
-                <a:spcPts val="2716"/>
-              </a:lnSpc>
-              <a:buNone/>
-            </a:pPr>
-            <a:r>
-              <a:rPr lang="en-US" sz="1698" dirty="0">
-                <a:solidFill>
-                  <a:srgbClr val="DAD1E6"/>
-                </a:solidFill>
-                <a:latin typeface="Fira Sans" pitchFamily="34" charset="0"/>
-                <a:ea typeface="Fira Sans" pitchFamily="34" charset="-122"/>
-                <a:cs typeface="Fira Sans" pitchFamily="34" charset="-120"/>
-              </a:rPr>
-              <a:t>El estándar de compresión de video H.264 utilizó técnicas basadas en Wavelets para lograr una alta eficiencia de compresión y una claridad de reproducción.</a:t>
-            </a:r>
-            <a:endParaRPr lang="en-US" sz="1698" dirty="0"/>
+        </p:spPr>
+        <p:txBody>
+          <a:bodyPr wrap="square" rtlCol="0">
+            <a:spAutoFit/>
+          </a:bodyPr>
+          <a:lstStyle/>
+          <a:p>
+            <a:r>
+              <a:rPr lang="es-ES" dirty="0">
+                <a:solidFill>
+                  <a:srgbClr val="FF726D"/>
+                </a:solidFill>
+              </a:rPr>
+              <a:t>“</a:t>
+            </a:r>
+            <a:r>
+              <a:rPr lang="es-ES" dirty="0" err="1">
+                <a:solidFill>
+                  <a:srgbClr val="FF726D"/>
+                </a:solidFill>
+              </a:rPr>
+              <a:t>haar</a:t>
+            </a:r>
+            <a:r>
+              <a:rPr lang="es-ES" dirty="0">
+                <a:solidFill>
+                  <a:srgbClr val="FF726D"/>
+                </a:solidFill>
+              </a:rPr>
+              <a:t>”, </a:t>
+            </a:r>
+            <a:r>
+              <a:rPr lang="es-ES" dirty="0" err="1">
+                <a:solidFill>
+                  <a:srgbClr val="FF726D"/>
+                </a:solidFill>
+              </a:rPr>
+              <a:t>th</a:t>
+            </a:r>
+            <a:r>
+              <a:rPr lang="es-ES" dirty="0">
+                <a:solidFill>
+                  <a:srgbClr val="FF726D"/>
+                </a:solidFill>
+              </a:rPr>
+              <a:t> = 5 – 105kB</a:t>
+            </a:r>
           </a:p>
         </p:txBody>
       </p:sp>
       <p:pic>
         <p:nvPicPr>
-          <p:cNvPr id="11" name="Image 2" descr="preencoded.png">
-            <a:hlinkClick r:id="rId5"/>
+          <p:cNvPr id="26" name="Imagen 25" descr="Imagen en blanco y negro de una mujer con un sombrero&#10;&#10;Descripción generada automáticamente">
+            <a:extLst>
+              <a:ext uri="{FF2B5EF4-FFF2-40B4-BE49-F238E27FC236}">
+                <a16:creationId xmlns:a16="http://schemas.microsoft.com/office/drawing/2014/main" id="{761BEA3F-43F7-C5B5-48A4-FCA9CA1505F9}"/>
+              </a:ext>
+            </a:extLst>
+          </p:cNvPr>
+          <p:cNvPicPr>
+            <a:picLocks noChangeAspect="1"/>
+          </p:cNvPicPr>
+          <p:nvPr/>
+        </p:nvPicPr>
+        <p:blipFill>
+          <a:blip r:embed="rId5"/>
+          <a:stretch>
+            <a:fillRect/>
+          </a:stretch>
+        </p:blipFill>
+        <p:spPr>
+          <a:xfrm>
+            <a:off x="4056869" y="4543082"/>
+            <a:ext cx="2947505" cy="2947505"/>
+          </a:xfrm>
+          <a:prstGeom prst="rect">
+            <a:avLst/>
+          </a:prstGeom>
+          <a:ln w="19050">
+            <a:solidFill>
+              <a:srgbClr val="FF726D"/>
+            </a:solidFill>
+          </a:ln>
+        </p:spPr>
+      </p:pic>
+      <p:sp>
+        <p:nvSpPr>
+          <p:cNvPr id="27" name="CuadroTexto 26">
+            <a:extLst>
+              <a:ext uri="{FF2B5EF4-FFF2-40B4-BE49-F238E27FC236}">
+                <a16:creationId xmlns:a16="http://schemas.microsoft.com/office/drawing/2014/main" id="{C2B24AB9-3B5B-8E4C-7402-647C2F5B3ADB}"/>
+              </a:ext>
+            </a:extLst>
+          </p:cNvPr>
+          <p:cNvSpPr txBox="1"/>
+          <p:nvPr/>
+        </p:nvSpPr>
+        <p:spPr>
+          <a:xfrm>
+            <a:off x="4821382" y="7484295"/>
+            <a:ext cx="2447529" cy="380616"/>
+          </a:xfrm>
+          <a:prstGeom prst="rect">
+            <a:avLst/>
+          </a:prstGeom>
+          <a:noFill/>
+        </p:spPr>
+        <p:txBody>
+          <a:bodyPr wrap="square" rtlCol="0">
+            <a:spAutoFit/>
+          </a:bodyPr>
+          <a:lstStyle/>
+          <a:p>
+            <a:r>
+              <a:rPr lang="es-ES" dirty="0">
+                <a:solidFill>
+                  <a:srgbClr val="FF726D"/>
+                </a:solidFill>
+              </a:rPr>
+              <a:t>“db2”, </a:t>
+            </a:r>
+            <a:r>
+              <a:rPr lang="es-ES" dirty="0" err="1">
+                <a:solidFill>
+                  <a:srgbClr val="FF726D"/>
+                </a:solidFill>
+              </a:rPr>
+              <a:t>th</a:t>
+            </a:r>
+            <a:r>
+              <a:rPr lang="es-ES" dirty="0">
+                <a:solidFill>
+                  <a:srgbClr val="FF726D"/>
+                </a:solidFill>
+              </a:rPr>
+              <a:t> = 5 – 136kB</a:t>
+            </a:r>
+          </a:p>
+        </p:txBody>
+      </p:sp>
+      <p:pic>
+        <p:nvPicPr>
+          <p:cNvPr id="29" name="Imagen 28" descr="Imagen en blanco y negro de una mujer con un sombrero&#10;&#10;Descripción generada automáticamente">
+            <a:extLst>
+              <a:ext uri="{FF2B5EF4-FFF2-40B4-BE49-F238E27FC236}">
+                <a16:creationId xmlns:a16="http://schemas.microsoft.com/office/drawing/2014/main" id="{EAD40E27-65A4-8417-70AC-68F518DE14EB}"/>
+              </a:ext>
+            </a:extLst>
           </p:cNvPr>
           <p:cNvPicPr>
             <a:picLocks noChangeAspect="1"/>
@@ -4733,14 +4697,332 @@
         </p:blipFill>
         <p:spPr>
           <a:xfrm>
-            <a:off x="12242153" y="7589520"/>
-            <a:ext cx="2296807" cy="548640"/>
-          </a:xfrm>
-          <a:prstGeom prst="rect">
-            <a:avLst/>
-          </a:prstGeom>
+            <a:off x="626917" y="4548074"/>
+            <a:ext cx="2947505" cy="2947505"/>
+          </a:xfrm>
+          <a:prstGeom prst="rect">
+            <a:avLst/>
+          </a:prstGeom>
+          <a:ln w="19050">
+            <a:solidFill>
+              <a:srgbClr val="FF726D"/>
+            </a:solidFill>
+          </a:ln>
         </p:spPr>
       </p:pic>
+      <p:sp>
+        <p:nvSpPr>
+          <p:cNvPr id="30" name="CuadroTexto 29">
+            <a:extLst>
+              <a:ext uri="{FF2B5EF4-FFF2-40B4-BE49-F238E27FC236}">
+                <a16:creationId xmlns:a16="http://schemas.microsoft.com/office/drawing/2014/main" id="{82DE4CAC-4DBE-F021-F830-1B05BA8A356A}"/>
+              </a:ext>
+            </a:extLst>
+          </p:cNvPr>
+          <p:cNvSpPr txBox="1"/>
+          <p:nvPr/>
+        </p:nvSpPr>
+        <p:spPr>
+          <a:xfrm>
+            <a:off x="1139231" y="7484295"/>
+            <a:ext cx="2637240" cy="380616"/>
+          </a:xfrm>
+          <a:prstGeom prst="rect">
+            <a:avLst/>
+          </a:prstGeom>
+          <a:noFill/>
+        </p:spPr>
+        <p:txBody>
+          <a:bodyPr wrap="square" rtlCol="0">
+            <a:spAutoFit/>
+          </a:bodyPr>
+          <a:lstStyle/>
+          <a:p>
+            <a:r>
+              <a:rPr lang="es-ES" dirty="0">
+                <a:solidFill>
+                  <a:srgbClr val="FF726D"/>
+                </a:solidFill>
+              </a:rPr>
+              <a:t>“</a:t>
+            </a:r>
+            <a:r>
+              <a:rPr lang="es-ES" dirty="0" err="1">
+                <a:solidFill>
+                  <a:srgbClr val="FF726D"/>
+                </a:solidFill>
+              </a:rPr>
+              <a:t>haar</a:t>
+            </a:r>
+            <a:r>
+              <a:rPr lang="es-ES" dirty="0">
+                <a:solidFill>
+                  <a:srgbClr val="FF726D"/>
+                </a:solidFill>
+              </a:rPr>
+              <a:t>”, </a:t>
+            </a:r>
+            <a:r>
+              <a:rPr lang="es-ES" dirty="0" err="1">
+                <a:solidFill>
+                  <a:srgbClr val="FF726D"/>
+                </a:solidFill>
+              </a:rPr>
+              <a:t>th</a:t>
+            </a:r>
+            <a:r>
+              <a:rPr lang="es-ES" dirty="0">
+                <a:solidFill>
+                  <a:srgbClr val="FF726D"/>
+                </a:solidFill>
+              </a:rPr>
+              <a:t> = 0.1 – 146kB</a:t>
+            </a:r>
+          </a:p>
+        </p:txBody>
+      </p:sp>
+      <p:sp>
+        <p:nvSpPr>
+          <p:cNvPr id="31" name="Text 10">
+            <a:extLst>
+              <a:ext uri="{FF2B5EF4-FFF2-40B4-BE49-F238E27FC236}">
+                <a16:creationId xmlns:a16="http://schemas.microsoft.com/office/drawing/2014/main" id="{AFEDA8D4-6D5F-5D19-15E5-E0A43B3767B3}"/>
+              </a:ext>
+            </a:extLst>
+          </p:cNvPr>
+          <p:cNvSpPr/>
+          <p:nvPr/>
+        </p:nvSpPr>
+        <p:spPr>
+          <a:xfrm>
+            <a:off x="7966995" y="1963178"/>
+            <a:ext cx="5780178" cy="3502439"/>
+          </a:xfrm>
+          <a:prstGeom prst="rect">
+            <a:avLst/>
+          </a:prstGeom>
+          <a:noFill/>
+          <a:ln/>
+        </p:spPr>
+        <p:txBody>
+          <a:bodyPr wrap="square" rtlCol="0" anchor="t"/>
+          <a:lstStyle/>
+          <a:p>
+            <a:pPr marL="0" indent="0">
+              <a:lnSpc>
+                <a:spcPts val="2724"/>
+              </a:lnSpc>
+              <a:buNone/>
+            </a:pPr>
+            <a:r>
+              <a:rPr lang="en-US" sz="1702" dirty="0">
+                <a:solidFill>
+                  <a:srgbClr val="DAD1E6"/>
+                </a:solidFill>
+                <a:latin typeface="Fira Sans" pitchFamily="34" charset="0"/>
+                <a:ea typeface="Fira Sans" pitchFamily="34" charset="-122"/>
+                <a:cs typeface="Fira Sans" pitchFamily="34" charset="-120"/>
+              </a:rPr>
+              <a:t>En lo relative a la compression de </a:t>
+            </a:r>
+            <a:r>
+              <a:rPr lang="en-US" sz="1702" dirty="0" err="1">
+                <a:solidFill>
+                  <a:srgbClr val="DAD1E6"/>
+                </a:solidFill>
+                <a:latin typeface="Fira Sans" pitchFamily="34" charset="0"/>
+                <a:ea typeface="Fira Sans" pitchFamily="34" charset="-122"/>
+                <a:cs typeface="Fira Sans" pitchFamily="34" charset="-120"/>
+              </a:rPr>
+              <a:t>imagenes</a:t>
+            </a:r>
+            <a:r>
+              <a:rPr lang="en-US" sz="1702" dirty="0">
+                <a:solidFill>
+                  <a:srgbClr val="DAD1E6"/>
+                </a:solidFill>
+                <a:latin typeface="Fira Sans" pitchFamily="34" charset="0"/>
+                <a:ea typeface="Fira Sans" pitchFamily="34" charset="-122"/>
+                <a:cs typeface="Fira Sans" pitchFamily="34" charset="-120"/>
+              </a:rPr>
+              <a:t> via Wavelets hay </a:t>
+            </a:r>
+            <a:r>
+              <a:rPr lang="en-US" sz="1702" dirty="0" err="1">
+                <a:solidFill>
+                  <a:srgbClr val="DAD1E6"/>
+                </a:solidFill>
+                <a:latin typeface="Fira Sans" pitchFamily="34" charset="0"/>
+                <a:ea typeface="Fira Sans" pitchFamily="34" charset="-122"/>
+                <a:cs typeface="Fira Sans" pitchFamily="34" charset="-120"/>
+              </a:rPr>
+              <a:t>varios</a:t>
+            </a:r>
+            <a:r>
+              <a:rPr lang="en-US" sz="1702" dirty="0">
+                <a:solidFill>
+                  <a:srgbClr val="DAD1E6"/>
+                </a:solidFill>
+                <a:latin typeface="Fira Sans" pitchFamily="34" charset="0"/>
+                <a:ea typeface="Fira Sans" pitchFamily="34" charset="-122"/>
+                <a:cs typeface="Fira Sans" pitchFamily="34" charset="-120"/>
+              </a:rPr>
+              <a:t> </a:t>
+            </a:r>
+            <a:r>
+              <a:rPr lang="en-US" sz="1702" dirty="0" err="1">
+                <a:solidFill>
+                  <a:srgbClr val="DAD1E6"/>
+                </a:solidFill>
+                <a:latin typeface="Fira Sans" pitchFamily="34" charset="0"/>
+                <a:ea typeface="Fira Sans" pitchFamily="34" charset="-122"/>
+                <a:cs typeface="Fira Sans" pitchFamily="34" charset="-120"/>
+              </a:rPr>
+              <a:t>parámetros</a:t>
+            </a:r>
+            <a:r>
+              <a:rPr lang="en-US" sz="1702" dirty="0">
+                <a:solidFill>
+                  <a:srgbClr val="DAD1E6"/>
+                </a:solidFill>
+                <a:latin typeface="Fira Sans" pitchFamily="34" charset="0"/>
+                <a:ea typeface="Fira Sans" pitchFamily="34" charset="-122"/>
+                <a:cs typeface="Fira Sans" pitchFamily="34" charset="-120"/>
+              </a:rPr>
+              <a:t> a </a:t>
+            </a:r>
+            <a:r>
+              <a:rPr lang="en-US" sz="1702" dirty="0" err="1">
+                <a:solidFill>
+                  <a:srgbClr val="DAD1E6"/>
+                </a:solidFill>
+                <a:latin typeface="Fira Sans" pitchFamily="34" charset="0"/>
+                <a:ea typeface="Fira Sans" pitchFamily="34" charset="-122"/>
+                <a:cs typeface="Fira Sans" pitchFamily="34" charset="-120"/>
+              </a:rPr>
+              <a:t>tener</a:t>
+            </a:r>
+            <a:r>
+              <a:rPr lang="en-US" sz="1702" dirty="0">
+                <a:solidFill>
+                  <a:srgbClr val="DAD1E6"/>
+                </a:solidFill>
+                <a:latin typeface="Fira Sans" pitchFamily="34" charset="0"/>
+                <a:ea typeface="Fira Sans" pitchFamily="34" charset="-122"/>
+                <a:cs typeface="Fira Sans" pitchFamily="34" charset="-120"/>
+              </a:rPr>
+              <a:t> </a:t>
+            </a:r>
+            <a:r>
+              <a:rPr lang="en-US" sz="1702" dirty="0" err="1">
+                <a:solidFill>
+                  <a:srgbClr val="DAD1E6"/>
+                </a:solidFill>
+                <a:latin typeface="Fira Sans" pitchFamily="34" charset="0"/>
+                <a:ea typeface="Fira Sans" pitchFamily="34" charset="-122"/>
+                <a:cs typeface="Fira Sans" pitchFamily="34" charset="-120"/>
+              </a:rPr>
+              <a:t>en</a:t>
+            </a:r>
+            <a:r>
+              <a:rPr lang="en-US" sz="1702" dirty="0">
+                <a:solidFill>
+                  <a:srgbClr val="DAD1E6"/>
+                </a:solidFill>
+                <a:latin typeface="Fira Sans" pitchFamily="34" charset="0"/>
+                <a:ea typeface="Fira Sans" pitchFamily="34" charset="-122"/>
+                <a:cs typeface="Fira Sans" pitchFamily="34" charset="-120"/>
+              </a:rPr>
+              <a:t> </a:t>
+            </a:r>
+            <a:r>
+              <a:rPr lang="en-US" sz="1702" dirty="0" err="1">
+                <a:solidFill>
+                  <a:srgbClr val="DAD1E6"/>
+                </a:solidFill>
+                <a:latin typeface="Fira Sans" pitchFamily="34" charset="0"/>
+                <a:ea typeface="Fira Sans" pitchFamily="34" charset="-122"/>
+                <a:cs typeface="Fira Sans" pitchFamily="34" charset="-120"/>
+              </a:rPr>
+              <a:t>cuenta</a:t>
+            </a:r>
+            <a:endParaRPr lang="en-US" sz="1702" dirty="0">
+              <a:solidFill>
+                <a:srgbClr val="DAD1E6"/>
+              </a:solidFill>
+              <a:latin typeface="Fira Sans" pitchFamily="34" charset="0"/>
+              <a:ea typeface="Fira Sans" pitchFamily="34" charset="-122"/>
+              <a:cs typeface="Fira Sans" pitchFamily="34" charset="-120"/>
+            </a:endParaRPr>
+          </a:p>
+          <a:p>
+            <a:pPr marL="0" indent="0">
+              <a:lnSpc>
+                <a:spcPts val="2724"/>
+              </a:lnSpc>
+              <a:buNone/>
+            </a:pPr>
+            <a:endParaRPr lang="en-US" sz="1702" dirty="0">
+              <a:solidFill>
+                <a:srgbClr val="DAD1E6"/>
+              </a:solidFill>
+              <a:latin typeface="Fira Sans" pitchFamily="34" charset="0"/>
+            </a:endParaRPr>
+          </a:p>
+          <a:p>
+            <a:pPr marL="285750" indent="-285750">
+              <a:lnSpc>
+                <a:spcPts val="2724"/>
+              </a:lnSpc>
+              <a:buFont typeface="Arial" panose="020B0604020202020204" pitchFamily="34" charset="0"/>
+              <a:buChar char="•"/>
+            </a:pPr>
+            <a:r>
+              <a:rPr lang="en-US" sz="1702" dirty="0">
+                <a:solidFill>
+                  <a:srgbClr val="DAD1E6"/>
+                </a:solidFill>
+                <a:latin typeface="Fira Sans" pitchFamily="34" charset="0"/>
+              </a:rPr>
+              <a:t>Familia de wavelets:</a:t>
+            </a:r>
+          </a:p>
+          <a:p>
+            <a:pPr marL="285750" indent="-285750">
+              <a:lnSpc>
+                <a:spcPts val="2724"/>
+              </a:lnSpc>
+              <a:buFont typeface="Arial" panose="020B0604020202020204" pitchFamily="34" charset="0"/>
+              <a:buChar char="•"/>
+            </a:pPr>
+            <a:endParaRPr lang="en-US" sz="1702" dirty="0">
+              <a:solidFill>
+                <a:srgbClr val="DAD1E6"/>
+              </a:solidFill>
+              <a:latin typeface="Fira Sans" pitchFamily="34" charset="0"/>
+            </a:endParaRPr>
+          </a:p>
+          <a:p>
+            <a:pPr marL="285750" indent="-285750">
+              <a:lnSpc>
+                <a:spcPts val="2724"/>
+              </a:lnSpc>
+              <a:buFont typeface="Arial" panose="020B0604020202020204" pitchFamily="34" charset="0"/>
+              <a:buChar char="•"/>
+            </a:pPr>
+            <a:r>
+              <a:rPr lang="en-US" sz="1702" dirty="0">
+                <a:solidFill>
+                  <a:srgbClr val="DAD1E6"/>
+                </a:solidFill>
+                <a:latin typeface="Fira Sans" pitchFamily="34" charset="0"/>
+              </a:rPr>
+              <a:t>Umbral</a:t>
+            </a:r>
+            <a:endParaRPr lang="en-US" sz="1702" dirty="0"/>
+          </a:p>
+        </p:txBody>
+      </p:sp>
     </p:spTree>
   </p:cSld>
   <p:clrMapOvr>
@@ -5281,7 +5563,7 @@
         <p:spPr>
           <a:xfrm>
             <a:off x="7648456" y="5933956"/>
-            <a:ext cx="4721781" cy="1421606"/>
+            <a:ext cx="4943951" cy="1421606"/>
           </a:xfrm>
           <a:prstGeom prst="rect">
             <a:avLst/>
@@ -5314,32 +5596,6 @@
           </a:p>
         </p:txBody>
       </p:sp>
-      <p:pic>
-        <p:nvPicPr>
-          <p:cNvPr id="17" name="Image 0" descr="preencoded.png">
-            <a:hlinkClick r:id="rId3"/>
-          </p:cNvPr>
-          <p:cNvPicPr>
-            <a:picLocks noChangeAspect="1"/>
-          </p:cNvPicPr>
-          <p:nvPr/>
-        </p:nvPicPr>
-        <p:blipFill>
-          <a:blip r:embed="rId4"/>
-          <a:stretch>
-            <a:fillRect/>
-          </a:stretch>
-        </p:blipFill>
-        <p:spPr>
-          <a:xfrm>
-            <a:off x="12242153" y="7589520"/>
-            <a:ext cx="2296807" cy="548640"/>
-          </a:xfrm>
-          <a:prstGeom prst="rect">
-            <a:avLst/>
-          </a:prstGeom>
-        </p:spPr>
-      </p:pic>
     </p:spTree>
   </p:cSld>
   <p:clrMapOvr>
@@ -5503,33 +5759,2505 @@
           </a:p>
         </p:txBody>
       </p:sp>
-      <p:pic>
-        <p:nvPicPr>
-          <p:cNvPr id="6" name="Image 0" descr="preencoded.png">
-            <a:hlinkClick r:id="rId3"/>
-          </p:cNvPr>
-          <p:cNvPicPr>
-            <a:picLocks noChangeAspect="1"/>
-          </p:cNvPicPr>
-          <p:nvPr/>
-        </p:nvPicPr>
-        <p:blipFill>
-          <a:blip r:embed="rId4"/>
-          <a:stretch>
-            <a:fillRect/>
-          </a:stretch>
-        </p:blipFill>
-        <p:spPr>
-          <a:xfrm>
-            <a:off x="12242153" y="7589520"/>
-            <a:ext cx="2296807" cy="548640"/>
-          </a:xfrm>
-          <a:prstGeom prst="rect">
-            <a:avLst/>
-          </a:prstGeom>
-        </p:spPr>
-      </p:pic>
     </p:spTree>
+  </p:cSld>
+  <p:clrMapOvr>
+    <a:masterClrMapping/>
+  </p:clrMapOvr>
+</p:sld>
+</file>
+
+<file path=ppt/slides/slide9.xml><?xml version="1.0" encoding="utf-8"?>
+<p:sld xmlns:a="http://schemas.openxmlformats.org/drawingml/2006/main" xmlns:r="http://schemas.openxmlformats.org/officeDocument/2006/relationships" xmlns:p="http://schemas.openxmlformats.org/presentationml/2006/main">
+  <p:cSld>
+    <p:spTree>
+      <p:nvGrpSpPr>
+        <p:cNvPr id="1" name=""/>
+        <p:cNvGrpSpPr/>
+        <p:nvPr/>
+      </p:nvGrpSpPr>
+      <p:grpSpPr>
+        <a:xfrm>
+          <a:off x="0" y="0"/>
+          <a:ext cx="0" cy="0"/>
+          <a:chOff x="0" y="0"/>
+          <a:chExt cx="0" cy="0"/>
+        </a:xfrm>
+      </p:grpSpPr>
+      <p:sp>
+        <p:nvSpPr>
+          <p:cNvPr id="2" name="Shape 0"/>
+          <p:cNvSpPr/>
+          <p:nvPr/>
+        </p:nvSpPr>
+        <p:spPr>
+          <a:xfrm>
+            <a:off x="0" y="0"/>
+            <a:ext cx="14630400" cy="8229600"/>
+          </a:xfrm>
+          <a:prstGeom prst="rect">
+            <a:avLst/>
+          </a:prstGeom>
+          <a:solidFill>
+            <a:srgbClr val="110C17"/>
+          </a:solidFill>
+          <a:ln/>
+        </p:spPr>
+        <p:txBody>
+          <a:bodyPr/>
+          <a:lstStyle/>
+          <a:p>
+            <a:endParaRPr lang="es-ES"/>
+          </a:p>
+        </p:txBody>
+      </p:sp>
+      <p:sp>
+        <p:nvSpPr>
+          <p:cNvPr id="3" name="Shape 1"/>
+          <p:cNvSpPr/>
+          <p:nvPr/>
+        </p:nvSpPr>
+        <p:spPr>
+          <a:xfrm>
+            <a:off x="0" y="0"/>
+            <a:ext cx="14630400" cy="8229600"/>
+          </a:xfrm>
+          <a:prstGeom prst="rect">
+            <a:avLst/>
+          </a:prstGeom>
+          <a:solidFill>
+            <a:srgbClr val="241631"/>
+          </a:solidFill>
+          <a:ln/>
+        </p:spPr>
+        <p:txBody>
+          <a:bodyPr/>
+          <a:lstStyle/>
+          <a:p>
+            <a:endParaRPr lang="es-ES"/>
+          </a:p>
+        </p:txBody>
+      </p:sp>
+      <p:sp>
+        <p:nvSpPr>
+          <p:cNvPr id="4" name="Text 2"/>
+          <p:cNvSpPr/>
+          <p:nvPr/>
+        </p:nvSpPr>
+        <p:spPr>
+          <a:xfrm>
+            <a:off x="676784" y="612803"/>
+            <a:ext cx="4601798" cy="748406"/>
+          </a:xfrm>
+          <a:prstGeom prst="rect">
+            <a:avLst/>
+          </a:prstGeom>
+          <a:noFill/>
+          <a:ln/>
+        </p:spPr>
+        <p:txBody>
+          <a:bodyPr wrap="square" rtlCol="0" anchor="t"/>
+          <a:lstStyle/>
+          <a:p>
+            <a:pPr marL="0" indent="0">
+              <a:lnSpc>
+                <a:spcPts val="5468"/>
+              </a:lnSpc>
+              <a:buNone/>
+            </a:pPr>
+            <a:r>
+              <a:rPr lang="en-US" sz="4374" b="1" dirty="0">
+                <a:solidFill>
+                  <a:srgbClr val="FF726D"/>
+                </a:solidFill>
+                <a:latin typeface="Inconsolata" pitchFamily="34" charset="0"/>
+                <a:ea typeface="Inconsolata" pitchFamily="34" charset="-122"/>
+                <a:cs typeface="Inconsolata" pitchFamily="34" charset="-120"/>
+              </a:rPr>
+              <a:t>Código </a:t>
+            </a:r>
+            <a:r>
+              <a:rPr lang="en-US" sz="4374" b="1" dirty="0" err="1">
+                <a:solidFill>
+                  <a:srgbClr val="FF726D"/>
+                </a:solidFill>
+                <a:latin typeface="Inconsolata" pitchFamily="34" charset="0"/>
+                <a:ea typeface="Inconsolata" pitchFamily="34" charset="-122"/>
+                <a:cs typeface="Inconsolata" pitchFamily="34" charset="-120"/>
+              </a:rPr>
+              <a:t>utilizado</a:t>
+            </a:r>
+            <a:endParaRPr lang="en-US" sz="4374" dirty="0"/>
+          </a:p>
+        </p:txBody>
+      </p:sp>
+      <p:sp>
+        <p:nvSpPr>
+          <p:cNvPr id="5" name="Text 3"/>
+          <p:cNvSpPr/>
+          <p:nvPr/>
+        </p:nvSpPr>
+        <p:spPr>
+          <a:xfrm>
+            <a:off x="1113202" y="1654363"/>
+            <a:ext cx="11023381" cy="5775137"/>
+          </a:xfrm>
+          <a:prstGeom prst="rect">
+            <a:avLst/>
+          </a:prstGeom>
+          <a:noFill/>
+          <a:ln/>
+        </p:spPr>
+        <p:txBody>
+          <a:bodyPr wrap="square" rtlCol="0" anchor="t"/>
+          <a:lstStyle/>
+          <a:p>
+            <a:r>
+              <a:rPr lang="es-ES" sz="1600" b="0" dirty="0" err="1">
+                <a:solidFill>
+                  <a:srgbClr val="569CD6"/>
+                </a:solidFill>
+                <a:effectLst/>
+                <a:latin typeface="Consolas" panose="020B0609020204030204" pitchFamily="49" charset="0"/>
+              </a:rPr>
+              <a:t>def</a:t>
+            </a:r>
+            <a:r>
+              <a:rPr lang="es-ES" sz="1600" b="0" dirty="0">
+                <a:solidFill>
+                  <a:srgbClr val="CCCCCC"/>
+                </a:solidFill>
+                <a:effectLst/>
+                <a:latin typeface="Consolas" panose="020B0609020204030204" pitchFamily="49" charset="0"/>
+              </a:rPr>
+              <a:t> </a:t>
+            </a:r>
+            <a:r>
+              <a:rPr lang="es-ES" sz="1600" b="0" dirty="0" err="1">
+                <a:solidFill>
+                  <a:srgbClr val="DCDCAA"/>
+                </a:solidFill>
+                <a:effectLst/>
+                <a:latin typeface="Consolas" panose="020B0609020204030204" pitchFamily="49" charset="0"/>
+              </a:rPr>
+              <a:t>compress_image</a:t>
+            </a:r>
+            <a:r>
+              <a:rPr lang="es-ES" sz="1600" b="0" dirty="0">
+                <a:solidFill>
+                  <a:srgbClr val="CCCCCC"/>
+                </a:solidFill>
+                <a:effectLst/>
+                <a:latin typeface="Consolas" panose="020B0609020204030204" pitchFamily="49" charset="0"/>
+              </a:rPr>
+              <a:t>(</a:t>
+            </a:r>
+            <a:r>
+              <a:rPr lang="es-ES" sz="1600" b="0" dirty="0" err="1">
+                <a:solidFill>
+                  <a:srgbClr val="9CDCFE"/>
+                </a:solidFill>
+                <a:effectLst/>
+                <a:latin typeface="Consolas" panose="020B0609020204030204" pitchFamily="49" charset="0"/>
+              </a:rPr>
+              <a:t>image_path</a:t>
+            </a:r>
+            <a:r>
+              <a:rPr lang="es-ES" sz="1600" b="0" dirty="0">
+                <a:solidFill>
+                  <a:srgbClr val="CCCCCC"/>
+                </a:solidFill>
+                <a:effectLst/>
+                <a:latin typeface="Consolas" panose="020B0609020204030204" pitchFamily="49" charset="0"/>
+              </a:rPr>
+              <a:t>, </a:t>
+            </a:r>
+            <a:r>
+              <a:rPr lang="es-ES" sz="1600" b="0" dirty="0" err="1">
+                <a:solidFill>
+                  <a:srgbClr val="9CDCFE"/>
+                </a:solidFill>
+                <a:effectLst/>
+                <a:latin typeface="Consolas" panose="020B0609020204030204" pitchFamily="49" charset="0"/>
+              </a:rPr>
+              <a:t>wavelet_family</a:t>
+            </a:r>
+            <a:r>
+              <a:rPr lang="es-ES" sz="1600" b="0" dirty="0">
+                <a:solidFill>
+                  <a:srgbClr val="CCCCCC"/>
+                </a:solidFill>
+                <a:effectLst/>
+                <a:latin typeface="Consolas" panose="020B0609020204030204" pitchFamily="49" charset="0"/>
+              </a:rPr>
+              <a:t>):</a:t>
+            </a:r>
+          </a:p>
+          <a:p>
+            <a:r>
+              <a:rPr lang="es-ES" sz="1600" b="0" dirty="0">
+                <a:solidFill>
+                  <a:srgbClr val="CCCCCC"/>
+                </a:solidFill>
+                <a:effectLst/>
+                <a:latin typeface="Consolas" panose="020B0609020204030204" pitchFamily="49" charset="0"/>
+              </a:rPr>
+              <a:t>    </a:t>
+            </a:r>
+            <a:r>
+              <a:rPr lang="es-ES" sz="1600" b="0" dirty="0">
+                <a:solidFill>
+                  <a:srgbClr val="6A9955"/>
+                </a:solidFill>
+                <a:effectLst/>
+                <a:latin typeface="Consolas" panose="020B0609020204030204" pitchFamily="49" charset="0"/>
+              </a:rPr>
+              <a:t># Load </a:t>
+            </a:r>
+            <a:r>
+              <a:rPr lang="es-ES" sz="1600" b="0" dirty="0" err="1">
+                <a:solidFill>
+                  <a:srgbClr val="6A9955"/>
+                </a:solidFill>
+                <a:effectLst/>
+                <a:latin typeface="Consolas" panose="020B0609020204030204" pitchFamily="49" charset="0"/>
+              </a:rPr>
+              <a:t>the</a:t>
+            </a:r>
+            <a:r>
+              <a:rPr lang="es-ES" sz="1600" b="0" dirty="0">
+                <a:solidFill>
+                  <a:srgbClr val="6A9955"/>
+                </a:solidFill>
+                <a:effectLst/>
+                <a:latin typeface="Consolas" panose="020B0609020204030204" pitchFamily="49" charset="0"/>
+              </a:rPr>
+              <a:t> </a:t>
+            </a:r>
+            <a:r>
+              <a:rPr lang="es-ES" sz="1600" b="0" dirty="0" err="1">
+                <a:solidFill>
+                  <a:srgbClr val="6A9955"/>
+                </a:solidFill>
+                <a:effectLst/>
+                <a:latin typeface="Consolas" panose="020B0609020204030204" pitchFamily="49" charset="0"/>
+              </a:rPr>
+              <a:t>image</a:t>
+            </a:r>
+            <a:endParaRPr lang="es-ES" sz="1600" b="0" dirty="0">
+              <a:solidFill>
+                <a:srgbClr val="CCCCCC"/>
+              </a:solidFill>
+              <a:effectLst/>
+              <a:latin typeface="Consolas" panose="020B0609020204030204" pitchFamily="49" charset="0"/>
+            </a:endParaRPr>
+          </a:p>
+          <a:p>
+            <a:r>
+              <a:rPr lang="es-ES" sz="1600" b="0" dirty="0">
+                <a:solidFill>
+                  <a:srgbClr val="CCCCCC"/>
+                </a:solidFill>
+                <a:effectLst/>
+                <a:latin typeface="Consolas" panose="020B0609020204030204" pitchFamily="49" charset="0"/>
+              </a:rPr>
+              <a:t>    </a:t>
+            </a:r>
+            <a:r>
+              <a:rPr lang="es-ES" sz="1600" b="0" dirty="0" err="1">
+                <a:solidFill>
+                  <a:srgbClr val="9CDCFE"/>
+                </a:solidFill>
+                <a:effectLst/>
+                <a:latin typeface="Consolas" panose="020B0609020204030204" pitchFamily="49" charset="0"/>
+              </a:rPr>
+              <a:t>image</a:t>
+            </a:r>
+            <a:r>
+              <a:rPr lang="es-ES" sz="1600" b="0" dirty="0">
+                <a:solidFill>
+                  <a:srgbClr val="CCCCCC"/>
+                </a:solidFill>
+                <a:effectLst/>
+                <a:latin typeface="Consolas" panose="020B0609020204030204" pitchFamily="49" charset="0"/>
+              </a:rPr>
+              <a:t> </a:t>
+            </a:r>
+            <a:r>
+              <a:rPr lang="es-ES" sz="1600" b="0" dirty="0">
+                <a:solidFill>
+                  <a:srgbClr val="D4D4D4"/>
+                </a:solidFill>
+                <a:effectLst/>
+                <a:latin typeface="Consolas" panose="020B0609020204030204" pitchFamily="49" charset="0"/>
+              </a:rPr>
+              <a:t>=</a:t>
+            </a:r>
+            <a:r>
+              <a:rPr lang="es-ES" sz="1600" b="0" dirty="0">
+                <a:solidFill>
+                  <a:srgbClr val="CCCCCC"/>
+                </a:solidFill>
+                <a:effectLst/>
+                <a:latin typeface="Consolas" panose="020B0609020204030204" pitchFamily="49" charset="0"/>
+              </a:rPr>
+              <a:t> </a:t>
+            </a:r>
+            <a:r>
+              <a:rPr lang="es-ES" sz="1600" b="0" dirty="0" err="1">
+                <a:solidFill>
+                  <a:srgbClr val="4EC9B0"/>
+                </a:solidFill>
+                <a:effectLst/>
+                <a:latin typeface="Consolas" panose="020B0609020204030204" pitchFamily="49" charset="0"/>
+              </a:rPr>
+              <a:t>Image</a:t>
+            </a:r>
+            <a:r>
+              <a:rPr lang="es-ES" sz="1600" b="0" dirty="0" err="1">
+                <a:solidFill>
+                  <a:srgbClr val="CCCCCC"/>
+                </a:solidFill>
+                <a:effectLst/>
+                <a:latin typeface="Consolas" panose="020B0609020204030204" pitchFamily="49" charset="0"/>
+              </a:rPr>
+              <a:t>.</a:t>
+            </a:r>
+            <a:r>
+              <a:rPr lang="es-ES" sz="1600" b="0" dirty="0" err="1">
+                <a:solidFill>
+                  <a:srgbClr val="DCDCAA"/>
+                </a:solidFill>
+                <a:effectLst/>
+                <a:latin typeface="Consolas" panose="020B0609020204030204" pitchFamily="49" charset="0"/>
+              </a:rPr>
+              <a:t>open</a:t>
+            </a:r>
+            <a:r>
+              <a:rPr lang="es-ES" sz="1600" b="0" dirty="0">
+                <a:solidFill>
+                  <a:srgbClr val="CCCCCC"/>
+                </a:solidFill>
+                <a:effectLst/>
+                <a:latin typeface="Consolas" panose="020B0609020204030204" pitchFamily="49" charset="0"/>
+              </a:rPr>
+              <a:t>(</a:t>
+            </a:r>
+            <a:r>
+              <a:rPr lang="es-ES" sz="1600" b="0" dirty="0" err="1">
+                <a:solidFill>
+                  <a:srgbClr val="9CDCFE"/>
+                </a:solidFill>
+                <a:effectLst/>
+                <a:latin typeface="Consolas" panose="020B0609020204030204" pitchFamily="49" charset="0"/>
+              </a:rPr>
+              <a:t>image_path</a:t>
+            </a:r>
+            <a:r>
+              <a:rPr lang="es-ES" sz="1600" b="0" dirty="0">
+                <a:solidFill>
+                  <a:srgbClr val="CCCCCC"/>
+                </a:solidFill>
+                <a:effectLst/>
+                <a:latin typeface="Consolas" panose="020B0609020204030204" pitchFamily="49" charset="0"/>
+              </a:rPr>
+              <a:t>).</a:t>
+            </a:r>
+            <a:r>
+              <a:rPr lang="es-ES" sz="1600" b="0" dirty="0" err="1">
+                <a:solidFill>
+                  <a:srgbClr val="DCDCAA"/>
+                </a:solidFill>
+                <a:effectLst/>
+                <a:latin typeface="Consolas" panose="020B0609020204030204" pitchFamily="49" charset="0"/>
+              </a:rPr>
+              <a:t>convert</a:t>
+            </a:r>
+            <a:r>
+              <a:rPr lang="es-ES" sz="1600" b="0" dirty="0">
+                <a:solidFill>
+                  <a:srgbClr val="CCCCCC"/>
+                </a:solidFill>
+                <a:effectLst/>
+                <a:latin typeface="Consolas" panose="020B0609020204030204" pitchFamily="49" charset="0"/>
+              </a:rPr>
+              <a:t>(</a:t>
+            </a:r>
+            <a:r>
+              <a:rPr lang="es-ES" sz="1600" b="0" dirty="0">
+                <a:solidFill>
+                  <a:srgbClr val="CE9178"/>
+                </a:solidFill>
+                <a:effectLst/>
+                <a:latin typeface="Consolas" panose="020B0609020204030204" pitchFamily="49" charset="0"/>
+              </a:rPr>
+              <a:t>'L'</a:t>
+            </a:r>
+            <a:r>
+              <a:rPr lang="es-ES" sz="1600" b="0" dirty="0">
+                <a:solidFill>
+                  <a:srgbClr val="CCCCCC"/>
+                </a:solidFill>
+                <a:effectLst/>
+                <a:latin typeface="Consolas" panose="020B0609020204030204" pitchFamily="49" charset="0"/>
+              </a:rPr>
+              <a:t>)</a:t>
+            </a:r>
+          </a:p>
+          <a:p>
+            <a:r>
+              <a:rPr lang="es-ES" sz="1600" b="0" dirty="0">
+                <a:solidFill>
+                  <a:srgbClr val="CCCCCC"/>
+                </a:solidFill>
+                <a:effectLst/>
+                <a:latin typeface="Consolas" panose="020B0609020204030204" pitchFamily="49" charset="0"/>
+              </a:rPr>
+              <a:t>    </a:t>
+            </a:r>
+            <a:r>
+              <a:rPr lang="es-ES" sz="1600" b="0" dirty="0">
+                <a:solidFill>
+                  <a:srgbClr val="6A9955"/>
+                </a:solidFill>
+                <a:effectLst/>
+                <a:latin typeface="Consolas" panose="020B0609020204030204" pitchFamily="49" charset="0"/>
+              </a:rPr>
+              <a:t># </a:t>
+            </a:r>
+            <a:r>
+              <a:rPr lang="es-ES" sz="1600" b="0" dirty="0" err="1">
+                <a:solidFill>
+                  <a:srgbClr val="6A9955"/>
+                </a:solidFill>
+                <a:effectLst/>
+                <a:latin typeface="Consolas" panose="020B0609020204030204" pitchFamily="49" charset="0"/>
+              </a:rPr>
+              <a:t>Convert</a:t>
+            </a:r>
+            <a:r>
+              <a:rPr lang="es-ES" sz="1600" b="0" dirty="0">
+                <a:solidFill>
+                  <a:srgbClr val="6A9955"/>
+                </a:solidFill>
+                <a:effectLst/>
+                <a:latin typeface="Consolas" panose="020B0609020204030204" pitchFamily="49" charset="0"/>
+              </a:rPr>
+              <a:t> </a:t>
+            </a:r>
+            <a:r>
+              <a:rPr lang="es-ES" sz="1600" b="0" dirty="0" err="1">
+                <a:solidFill>
+                  <a:srgbClr val="6A9955"/>
+                </a:solidFill>
+                <a:effectLst/>
+                <a:latin typeface="Consolas" panose="020B0609020204030204" pitchFamily="49" charset="0"/>
+              </a:rPr>
+              <a:t>the</a:t>
+            </a:r>
+            <a:r>
+              <a:rPr lang="es-ES" sz="1600" b="0" dirty="0">
+                <a:solidFill>
+                  <a:srgbClr val="6A9955"/>
+                </a:solidFill>
+                <a:effectLst/>
+                <a:latin typeface="Consolas" panose="020B0609020204030204" pitchFamily="49" charset="0"/>
+              </a:rPr>
+              <a:t> </a:t>
+            </a:r>
+            <a:r>
+              <a:rPr lang="es-ES" sz="1600" b="0" dirty="0" err="1">
+                <a:solidFill>
+                  <a:srgbClr val="6A9955"/>
+                </a:solidFill>
+                <a:effectLst/>
+                <a:latin typeface="Consolas" panose="020B0609020204030204" pitchFamily="49" charset="0"/>
+              </a:rPr>
+              <a:t>image</a:t>
+            </a:r>
+            <a:r>
+              <a:rPr lang="es-ES" sz="1600" b="0" dirty="0">
+                <a:solidFill>
+                  <a:srgbClr val="6A9955"/>
+                </a:solidFill>
+                <a:effectLst/>
+                <a:latin typeface="Consolas" panose="020B0609020204030204" pitchFamily="49" charset="0"/>
+              </a:rPr>
+              <a:t> </a:t>
+            </a:r>
+            <a:r>
+              <a:rPr lang="es-ES" sz="1600" b="0" dirty="0" err="1">
+                <a:solidFill>
+                  <a:srgbClr val="6A9955"/>
+                </a:solidFill>
+                <a:effectLst/>
+                <a:latin typeface="Consolas" panose="020B0609020204030204" pitchFamily="49" charset="0"/>
+              </a:rPr>
+              <a:t>to</a:t>
+            </a:r>
+            <a:r>
+              <a:rPr lang="es-ES" sz="1600" b="0" dirty="0">
+                <a:solidFill>
+                  <a:srgbClr val="6A9955"/>
+                </a:solidFill>
+                <a:effectLst/>
+                <a:latin typeface="Consolas" panose="020B0609020204030204" pitchFamily="49" charset="0"/>
+              </a:rPr>
+              <a:t> a </a:t>
+            </a:r>
+            <a:r>
+              <a:rPr lang="es-ES" sz="1600" b="0" dirty="0" err="1">
+                <a:solidFill>
+                  <a:srgbClr val="6A9955"/>
+                </a:solidFill>
+                <a:effectLst/>
+                <a:latin typeface="Consolas" panose="020B0609020204030204" pitchFamily="49" charset="0"/>
+              </a:rPr>
+              <a:t>numpy</a:t>
+            </a:r>
+            <a:r>
+              <a:rPr lang="es-ES" sz="1600" b="0" dirty="0">
+                <a:solidFill>
+                  <a:srgbClr val="6A9955"/>
+                </a:solidFill>
+                <a:effectLst/>
+                <a:latin typeface="Consolas" panose="020B0609020204030204" pitchFamily="49" charset="0"/>
+              </a:rPr>
+              <a:t> array</a:t>
+            </a:r>
+            <a:endParaRPr lang="es-ES" sz="1600" b="0" dirty="0">
+              <a:solidFill>
+                <a:srgbClr val="CCCCCC"/>
+              </a:solidFill>
+              <a:effectLst/>
+              <a:latin typeface="Consolas" panose="020B0609020204030204" pitchFamily="49" charset="0"/>
+            </a:endParaRPr>
+          </a:p>
+          <a:p>
+            <a:r>
+              <a:rPr lang="es-ES" sz="1600" b="0" dirty="0">
+                <a:solidFill>
+                  <a:srgbClr val="CCCCCC"/>
+                </a:solidFill>
+                <a:effectLst/>
+                <a:latin typeface="Consolas" panose="020B0609020204030204" pitchFamily="49" charset="0"/>
+              </a:rPr>
+              <a:t>    </a:t>
+            </a:r>
+            <a:r>
+              <a:rPr lang="es-ES" sz="1600" b="0" dirty="0" err="1">
+                <a:solidFill>
+                  <a:srgbClr val="9CDCFE"/>
+                </a:solidFill>
+                <a:effectLst/>
+                <a:latin typeface="Consolas" panose="020B0609020204030204" pitchFamily="49" charset="0"/>
+              </a:rPr>
+              <a:t>image_array</a:t>
+            </a:r>
+            <a:r>
+              <a:rPr lang="es-ES" sz="1600" b="0" dirty="0">
+                <a:solidFill>
+                  <a:srgbClr val="CCCCCC"/>
+                </a:solidFill>
+                <a:effectLst/>
+                <a:latin typeface="Consolas" panose="020B0609020204030204" pitchFamily="49" charset="0"/>
+              </a:rPr>
+              <a:t> </a:t>
+            </a:r>
+            <a:r>
+              <a:rPr lang="es-ES" sz="1600" b="0" dirty="0">
+                <a:solidFill>
+                  <a:srgbClr val="D4D4D4"/>
+                </a:solidFill>
+                <a:effectLst/>
+                <a:latin typeface="Consolas" panose="020B0609020204030204" pitchFamily="49" charset="0"/>
+              </a:rPr>
+              <a:t>=</a:t>
+            </a:r>
+            <a:r>
+              <a:rPr lang="es-ES" sz="1600" b="0" dirty="0">
+                <a:solidFill>
+                  <a:srgbClr val="CCCCCC"/>
+                </a:solidFill>
+                <a:effectLst/>
+                <a:latin typeface="Consolas" panose="020B0609020204030204" pitchFamily="49" charset="0"/>
+              </a:rPr>
+              <a:t> </a:t>
+            </a:r>
+            <a:r>
+              <a:rPr lang="es-ES" sz="1600" b="0" dirty="0" err="1">
+                <a:solidFill>
+                  <a:srgbClr val="4EC9B0"/>
+                </a:solidFill>
+                <a:effectLst/>
+                <a:latin typeface="Consolas" panose="020B0609020204030204" pitchFamily="49" charset="0"/>
+              </a:rPr>
+              <a:t>np</a:t>
+            </a:r>
+            <a:r>
+              <a:rPr lang="es-ES" sz="1600" b="0" dirty="0" err="1">
+                <a:solidFill>
+                  <a:srgbClr val="CCCCCC"/>
+                </a:solidFill>
+                <a:effectLst/>
+                <a:latin typeface="Consolas" panose="020B0609020204030204" pitchFamily="49" charset="0"/>
+              </a:rPr>
+              <a:t>.</a:t>
+            </a:r>
+            <a:r>
+              <a:rPr lang="es-ES" sz="1600" b="0" dirty="0" err="1">
+                <a:solidFill>
+                  <a:srgbClr val="DCDCAA"/>
+                </a:solidFill>
+                <a:effectLst/>
+                <a:latin typeface="Consolas" panose="020B0609020204030204" pitchFamily="49" charset="0"/>
+              </a:rPr>
+              <a:t>array</a:t>
+            </a:r>
+            <a:r>
+              <a:rPr lang="es-ES" sz="1600" b="0" dirty="0">
+                <a:solidFill>
+                  <a:srgbClr val="CCCCCC"/>
+                </a:solidFill>
+                <a:effectLst/>
+                <a:latin typeface="Consolas" panose="020B0609020204030204" pitchFamily="49" charset="0"/>
+              </a:rPr>
+              <a:t>(</a:t>
+            </a:r>
+            <a:r>
+              <a:rPr lang="es-ES" sz="1600" b="0" dirty="0" err="1">
+                <a:solidFill>
+                  <a:srgbClr val="9CDCFE"/>
+                </a:solidFill>
+                <a:effectLst/>
+                <a:latin typeface="Consolas" panose="020B0609020204030204" pitchFamily="49" charset="0"/>
+              </a:rPr>
+              <a:t>image</a:t>
+            </a:r>
+            <a:r>
+              <a:rPr lang="es-ES" sz="1600" b="0" dirty="0">
+                <a:solidFill>
+                  <a:srgbClr val="CCCCCC"/>
+                </a:solidFill>
+                <a:effectLst/>
+                <a:latin typeface="Consolas" panose="020B0609020204030204" pitchFamily="49" charset="0"/>
+              </a:rPr>
+              <a:t>)</a:t>
+            </a:r>
+          </a:p>
+          <a:p>
+            <a:r>
+              <a:rPr lang="es-ES" sz="1600" b="0" dirty="0">
+                <a:solidFill>
+                  <a:srgbClr val="CCCCCC"/>
+                </a:solidFill>
+                <a:effectLst/>
+                <a:latin typeface="Consolas" panose="020B0609020204030204" pitchFamily="49" charset="0"/>
+              </a:rPr>
+              <a:t>    </a:t>
+            </a:r>
+            <a:r>
+              <a:rPr lang="es-ES" sz="1600" b="0" dirty="0">
+                <a:solidFill>
+                  <a:srgbClr val="6A9955"/>
+                </a:solidFill>
+                <a:effectLst/>
+                <a:latin typeface="Consolas" panose="020B0609020204030204" pitchFamily="49" charset="0"/>
+              </a:rPr>
+              <a:t># </a:t>
+            </a:r>
+            <a:r>
+              <a:rPr lang="es-ES" sz="1600" b="0" dirty="0" err="1">
+                <a:solidFill>
+                  <a:srgbClr val="6A9955"/>
+                </a:solidFill>
+                <a:effectLst/>
+                <a:latin typeface="Consolas" panose="020B0609020204030204" pitchFamily="49" charset="0"/>
+              </a:rPr>
+              <a:t>Decompose</a:t>
+            </a:r>
+            <a:r>
+              <a:rPr lang="es-ES" sz="1600" b="0" dirty="0">
+                <a:solidFill>
+                  <a:srgbClr val="6A9955"/>
+                </a:solidFill>
+                <a:effectLst/>
+                <a:latin typeface="Consolas" panose="020B0609020204030204" pitchFamily="49" charset="0"/>
+              </a:rPr>
+              <a:t> </a:t>
+            </a:r>
+            <a:r>
+              <a:rPr lang="es-ES" sz="1600" b="0" dirty="0" err="1">
+                <a:solidFill>
+                  <a:srgbClr val="6A9955"/>
+                </a:solidFill>
+                <a:effectLst/>
+                <a:latin typeface="Consolas" panose="020B0609020204030204" pitchFamily="49" charset="0"/>
+              </a:rPr>
+              <a:t>the</a:t>
+            </a:r>
+            <a:r>
+              <a:rPr lang="es-ES" sz="1600" b="0" dirty="0">
+                <a:solidFill>
+                  <a:srgbClr val="6A9955"/>
+                </a:solidFill>
+                <a:effectLst/>
+                <a:latin typeface="Consolas" panose="020B0609020204030204" pitchFamily="49" charset="0"/>
+              </a:rPr>
+              <a:t> </a:t>
+            </a:r>
+            <a:r>
+              <a:rPr lang="es-ES" sz="1600" b="0" dirty="0" err="1">
+                <a:solidFill>
+                  <a:srgbClr val="6A9955"/>
+                </a:solidFill>
+                <a:effectLst/>
+                <a:latin typeface="Consolas" panose="020B0609020204030204" pitchFamily="49" charset="0"/>
+              </a:rPr>
+              <a:t>image</a:t>
+            </a:r>
+            <a:r>
+              <a:rPr lang="es-ES" sz="1600" b="0" dirty="0">
+                <a:solidFill>
+                  <a:srgbClr val="6A9955"/>
+                </a:solidFill>
+                <a:effectLst/>
+                <a:latin typeface="Consolas" panose="020B0609020204030204" pitchFamily="49" charset="0"/>
+              </a:rPr>
+              <a:t> </a:t>
+            </a:r>
+            <a:r>
+              <a:rPr lang="es-ES" sz="1600" b="0" dirty="0" err="1">
+                <a:solidFill>
+                  <a:srgbClr val="6A9955"/>
+                </a:solidFill>
+                <a:effectLst/>
+                <a:latin typeface="Consolas" panose="020B0609020204030204" pitchFamily="49" charset="0"/>
+              </a:rPr>
+              <a:t>using</a:t>
+            </a:r>
+            <a:r>
+              <a:rPr lang="es-ES" sz="1600" b="0" dirty="0">
+                <a:solidFill>
+                  <a:srgbClr val="6A9955"/>
+                </a:solidFill>
+                <a:effectLst/>
+                <a:latin typeface="Consolas" panose="020B0609020204030204" pitchFamily="49" charset="0"/>
+              </a:rPr>
+              <a:t> </a:t>
+            </a:r>
+            <a:r>
+              <a:rPr lang="es-ES" sz="1600" b="0" dirty="0" err="1">
+                <a:solidFill>
+                  <a:srgbClr val="6A9955"/>
+                </a:solidFill>
+                <a:effectLst/>
+                <a:latin typeface="Consolas" panose="020B0609020204030204" pitchFamily="49" charset="0"/>
+              </a:rPr>
+              <a:t>the</a:t>
+            </a:r>
+            <a:r>
+              <a:rPr lang="es-ES" sz="1600" b="0" dirty="0">
+                <a:solidFill>
+                  <a:srgbClr val="6A9955"/>
+                </a:solidFill>
+                <a:effectLst/>
+                <a:latin typeface="Consolas" panose="020B0609020204030204" pitchFamily="49" charset="0"/>
+              </a:rPr>
+              <a:t> </a:t>
+            </a:r>
+            <a:r>
+              <a:rPr lang="es-ES" sz="1600" b="0" dirty="0" err="1">
+                <a:solidFill>
+                  <a:srgbClr val="6A9955"/>
+                </a:solidFill>
+                <a:effectLst/>
+                <a:latin typeface="Consolas" panose="020B0609020204030204" pitchFamily="49" charset="0"/>
+              </a:rPr>
+              <a:t>specified</a:t>
+            </a:r>
+            <a:r>
+              <a:rPr lang="es-ES" sz="1600" b="0" dirty="0">
+                <a:solidFill>
+                  <a:srgbClr val="6A9955"/>
+                </a:solidFill>
+                <a:effectLst/>
+                <a:latin typeface="Consolas" panose="020B0609020204030204" pitchFamily="49" charset="0"/>
+              </a:rPr>
+              <a:t> wavelet </a:t>
+            </a:r>
+            <a:r>
+              <a:rPr lang="es-ES" sz="1600" b="0" dirty="0" err="1">
+                <a:solidFill>
+                  <a:srgbClr val="6A9955"/>
+                </a:solidFill>
+                <a:effectLst/>
+                <a:latin typeface="Consolas" panose="020B0609020204030204" pitchFamily="49" charset="0"/>
+              </a:rPr>
+              <a:t>family</a:t>
+            </a:r>
+            <a:endParaRPr lang="es-ES" sz="1600" b="0" dirty="0">
+              <a:solidFill>
+                <a:srgbClr val="CCCCCC"/>
+              </a:solidFill>
+              <a:effectLst/>
+              <a:latin typeface="Consolas" panose="020B0609020204030204" pitchFamily="49" charset="0"/>
+            </a:endParaRPr>
+          </a:p>
+          <a:p>
+            <a:r>
+              <a:rPr lang="es-ES" sz="1600" b="0" dirty="0">
+                <a:solidFill>
+                  <a:srgbClr val="CCCCCC"/>
+                </a:solidFill>
+                <a:effectLst/>
+                <a:latin typeface="Consolas" panose="020B0609020204030204" pitchFamily="49" charset="0"/>
+              </a:rPr>
+              <a:t>    </a:t>
+            </a:r>
+            <a:r>
+              <a:rPr lang="es-ES" sz="1600" b="0" dirty="0" err="1">
+                <a:solidFill>
+                  <a:srgbClr val="9CDCFE"/>
+                </a:solidFill>
+                <a:effectLst/>
+                <a:latin typeface="Consolas" panose="020B0609020204030204" pitchFamily="49" charset="0"/>
+              </a:rPr>
+              <a:t>coeffs</a:t>
+            </a:r>
+            <a:r>
+              <a:rPr lang="es-ES" sz="1600" b="0" dirty="0">
+                <a:solidFill>
+                  <a:srgbClr val="CCCCCC"/>
+                </a:solidFill>
+                <a:effectLst/>
+                <a:latin typeface="Consolas" panose="020B0609020204030204" pitchFamily="49" charset="0"/>
+              </a:rPr>
+              <a:t> </a:t>
+            </a:r>
+            <a:r>
+              <a:rPr lang="es-ES" sz="1600" b="0" dirty="0">
+                <a:solidFill>
+                  <a:srgbClr val="D4D4D4"/>
+                </a:solidFill>
+                <a:effectLst/>
+                <a:latin typeface="Consolas" panose="020B0609020204030204" pitchFamily="49" charset="0"/>
+              </a:rPr>
+              <a:t>=</a:t>
+            </a:r>
+            <a:r>
+              <a:rPr lang="es-ES" sz="1600" b="0" dirty="0">
+                <a:solidFill>
+                  <a:srgbClr val="CCCCCC"/>
+                </a:solidFill>
+                <a:effectLst/>
+                <a:latin typeface="Consolas" panose="020B0609020204030204" pitchFamily="49" charset="0"/>
+              </a:rPr>
+              <a:t> </a:t>
+            </a:r>
+            <a:r>
+              <a:rPr lang="es-ES" sz="1600" b="0" dirty="0">
+                <a:solidFill>
+                  <a:srgbClr val="4EC9B0"/>
+                </a:solidFill>
+                <a:effectLst/>
+                <a:latin typeface="Consolas" panose="020B0609020204030204" pitchFamily="49" charset="0"/>
+              </a:rPr>
+              <a:t>pywt</a:t>
+            </a:r>
+            <a:r>
+              <a:rPr lang="es-ES" sz="1600" b="0" dirty="0">
+                <a:solidFill>
+                  <a:srgbClr val="CCCCCC"/>
+                </a:solidFill>
+                <a:effectLst/>
+                <a:latin typeface="Consolas" panose="020B0609020204030204" pitchFamily="49" charset="0"/>
+              </a:rPr>
+              <a:t>.</a:t>
+            </a:r>
+            <a:r>
+              <a:rPr lang="es-ES" sz="1600" b="0" dirty="0">
+                <a:solidFill>
+                  <a:srgbClr val="DCDCAA"/>
+                </a:solidFill>
+                <a:effectLst/>
+                <a:latin typeface="Consolas" panose="020B0609020204030204" pitchFamily="49" charset="0"/>
+              </a:rPr>
+              <a:t>dwt2</a:t>
+            </a:r>
+            <a:r>
+              <a:rPr lang="es-ES" sz="1600" b="0" dirty="0">
+                <a:solidFill>
+                  <a:srgbClr val="CCCCCC"/>
+                </a:solidFill>
+                <a:effectLst/>
+                <a:latin typeface="Consolas" panose="020B0609020204030204" pitchFamily="49" charset="0"/>
+              </a:rPr>
+              <a:t>(</a:t>
+            </a:r>
+            <a:r>
+              <a:rPr lang="es-ES" sz="1600" b="0" dirty="0" err="1">
+                <a:solidFill>
+                  <a:srgbClr val="9CDCFE"/>
+                </a:solidFill>
+                <a:effectLst/>
+                <a:latin typeface="Consolas" panose="020B0609020204030204" pitchFamily="49" charset="0"/>
+              </a:rPr>
+              <a:t>image_array</a:t>
+            </a:r>
+            <a:r>
+              <a:rPr lang="es-ES" sz="1600" b="0" dirty="0">
+                <a:solidFill>
+                  <a:srgbClr val="CCCCCC"/>
+                </a:solidFill>
+                <a:effectLst/>
+                <a:latin typeface="Consolas" panose="020B0609020204030204" pitchFamily="49" charset="0"/>
+              </a:rPr>
+              <a:t>, </a:t>
+            </a:r>
+            <a:r>
+              <a:rPr lang="es-ES" sz="1600" b="0" dirty="0" err="1">
+                <a:solidFill>
+                  <a:srgbClr val="9CDCFE"/>
+                </a:solidFill>
+                <a:effectLst/>
+                <a:latin typeface="Consolas" panose="020B0609020204030204" pitchFamily="49" charset="0"/>
+              </a:rPr>
+              <a:t>wavelet_family</a:t>
+            </a:r>
+            <a:r>
+              <a:rPr lang="es-ES" sz="1600" b="0" dirty="0">
+                <a:solidFill>
+                  <a:srgbClr val="CCCCCC"/>
+                </a:solidFill>
+                <a:effectLst/>
+                <a:latin typeface="Consolas" panose="020B0609020204030204" pitchFamily="49" charset="0"/>
+              </a:rPr>
+              <a:t>)</a:t>
+            </a:r>
+          </a:p>
+          <a:p>
+            <a:r>
+              <a:rPr lang="es-ES" sz="1600" b="0" dirty="0">
+                <a:solidFill>
+                  <a:srgbClr val="CCCCCC"/>
+                </a:solidFill>
+                <a:effectLst/>
+                <a:latin typeface="Consolas" panose="020B0609020204030204" pitchFamily="49" charset="0"/>
+              </a:rPr>
+              <a:t>    </a:t>
+            </a:r>
+            <a:r>
+              <a:rPr lang="es-ES" sz="1600" b="0" dirty="0">
+                <a:solidFill>
+                  <a:srgbClr val="6A9955"/>
+                </a:solidFill>
+                <a:effectLst/>
+                <a:latin typeface="Consolas" panose="020B0609020204030204" pitchFamily="49" charset="0"/>
+              </a:rPr>
+              <a:t># </a:t>
+            </a:r>
+            <a:r>
+              <a:rPr lang="es-ES" sz="1600" b="0" dirty="0" err="1">
+                <a:solidFill>
+                  <a:srgbClr val="6A9955"/>
+                </a:solidFill>
+                <a:effectLst/>
+                <a:latin typeface="Consolas" panose="020B0609020204030204" pitchFamily="49" charset="0"/>
+              </a:rPr>
+              <a:t>Discard</a:t>
+            </a:r>
+            <a:r>
+              <a:rPr lang="es-ES" sz="1600" b="0" dirty="0">
+                <a:solidFill>
+                  <a:srgbClr val="6A9955"/>
+                </a:solidFill>
+                <a:effectLst/>
+                <a:latin typeface="Consolas" panose="020B0609020204030204" pitchFamily="49" charset="0"/>
+              </a:rPr>
+              <a:t> </a:t>
+            </a:r>
+            <a:r>
+              <a:rPr lang="es-ES" sz="1600" b="0" dirty="0" err="1">
+                <a:solidFill>
+                  <a:srgbClr val="6A9955"/>
+                </a:solidFill>
+                <a:effectLst/>
+                <a:latin typeface="Consolas" panose="020B0609020204030204" pitchFamily="49" charset="0"/>
+              </a:rPr>
+              <a:t>some</a:t>
+            </a:r>
+            <a:r>
+              <a:rPr lang="es-ES" sz="1600" b="0" dirty="0">
+                <a:solidFill>
+                  <a:srgbClr val="6A9955"/>
+                </a:solidFill>
+                <a:effectLst/>
+                <a:latin typeface="Consolas" panose="020B0609020204030204" pitchFamily="49" charset="0"/>
+              </a:rPr>
+              <a:t> </a:t>
+            </a:r>
+            <a:r>
+              <a:rPr lang="es-ES" sz="1600" b="0" dirty="0" err="1">
+                <a:solidFill>
+                  <a:srgbClr val="6A9955"/>
+                </a:solidFill>
+                <a:effectLst/>
+                <a:latin typeface="Consolas" panose="020B0609020204030204" pitchFamily="49" charset="0"/>
+              </a:rPr>
+              <a:t>of</a:t>
+            </a:r>
+            <a:r>
+              <a:rPr lang="es-ES" sz="1600" b="0" dirty="0">
+                <a:solidFill>
+                  <a:srgbClr val="6A9955"/>
+                </a:solidFill>
+                <a:effectLst/>
+                <a:latin typeface="Consolas" panose="020B0609020204030204" pitchFamily="49" charset="0"/>
+              </a:rPr>
+              <a:t> </a:t>
+            </a:r>
+            <a:r>
+              <a:rPr lang="es-ES" sz="1600" b="0" dirty="0" err="1">
+                <a:solidFill>
+                  <a:srgbClr val="6A9955"/>
+                </a:solidFill>
+                <a:effectLst/>
+                <a:latin typeface="Consolas" panose="020B0609020204030204" pitchFamily="49" charset="0"/>
+              </a:rPr>
+              <a:t>the</a:t>
+            </a:r>
+            <a:r>
+              <a:rPr lang="es-ES" sz="1600" b="0" dirty="0">
+                <a:solidFill>
+                  <a:srgbClr val="6A9955"/>
+                </a:solidFill>
+                <a:effectLst/>
+                <a:latin typeface="Consolas" panose="020B0609020204030204" pitchFamily="49" charset="0"/>
+              </a:rPr>
+              <a:t> </a:t>
+            </a:r>
+            <a:r>
+              <a:rPr lang="es-ES" sz="1600" b="0" dirty="0" err="1">
+                <a:solidFill>
+                  <a:srgbClr val="6A9955"/>
+                </a:solidFill>
+                <a:effectLst/>
+                <a:latin typeface="Consolas" panose="020B0609020204030204" pitchFamily="49" charset="0"/>
+              </a:rPr>
+              <a:t>coefficients</a:t>
+            </a:r>
+            <a:r>
+              <a:rPr lang="es-ES" sz="1600" b="0" dirty="0">
+                <a:solidFill>
+                  <a:srgbClr val="6A9955"/>
+                </a:solidFill>
+                <a:effectLst/>
+                <a:latin typeface="Consolas" panose="020B0609020204030204" pitchFamily="49" charset="0"/>
+              </a:rPr>
+              <a:t> </a:t>
+            </a:r>
+            <a:r>
+              <a:rPr lang="es-ES" sz="1600" b="0" dirty="0" err="1">
+                <a:solidFill>
+                  <a:srgbClr val="6A9955"/>
+                </a:solidFill>
+                <a:effectLst/>
+                <a:latin typeface="Consolas" panose="020B0609020204030204" pitchFamily="49" charset="0"/>
+              </a:rPr>
+              <a:t>to</a:t>
+            </a:r>
+            <a:r>
+              <a:rPr lang="es-ES" sz="1600" b="0" dirty="0">
+                <a:solidFill>
+                  <a:srgbClr val="6A9955"/>
+                </a:solidFill>
+                <a:effectLst/>
+                <a:latin typeface="Consolas" panose="020B0609020204030204" pitchFamily="49" charset="0"/>
+              </a:rPr>
+              <a:t> </a:t>
+            </a:r>
+            <a:r>
+              <a:rPr lang="es-ES" sz="1600" b="0" dirty="0" err="1">
+                <a:solidFill>
+                  <a:srgbClr val="6A9955"/>
+                </a:solidFill>
+                <a:effectLst/>
+                <a:latin typeface="Consolas" panose="020B0609020204030204" pitchFamily="49" charset="0"/>
+              </a:rPr>
+              <a:t>compress</a:t>
+            </a:r>
+            <a:r>
+              <a:rPr lang="es-ES" sz="1600" b="0" dirty="0">
+                <a:solidFill>
+                  <a:srgbClr val="6A9955"/>
+                </a:solidFill>
+                <a:effectLst/>
+                <a:latin typeface="Consolas" panose="020B0609020204030204" pitchFamily="49" charset="0"/>
+              </a:rPr>
+              <a:t> </a:t>
+            </a:r>
+            <a:r>
+              <a:rPr lang="es-ES" sz="1600" b="0" dirty="0" err="1">
+                <a:solidFill>
+                  <a:srgbClr val="6A9955"/>
+                </a:solidFill>
+                <a:effectLst/>
+                <a:latin typeface="Consolas" panose="020B0609020204030204" pitchFamily="49" charset="0"/>
+              </a:rPr>
+              <a:t>the</a:t>
+            </a:r>
+            <a:r>
+              <a:rPr lang="es-ES" sz="1600" b="0" dirty="0">
+                <a:solidFill>
+                  <a:srgbClr val="6A9955"/>
+                </a:solidFill>
+                <a:effectLst/>
+                <a:latin typeface="Consolas" panose="020B0609020204030204" pitchFamily="49" charset="0"/>
+              </a:rPr>
+              <a:t> </a:t>
+            </a:r>
+            <a:r>
+              <a:rPr lang="es-ES" sz="1600" b="0" dirty="0" err="1">
+                <a:solidFill>
+                  <a:srgbClr val="6A9955"/>
+                </a:solidFill>
+                <a:effectLst/>
+                <a:latin typeface="Consolas" panose="020B0609020204030204" pitchFamily="49" charset="0"/>
+              </a:rPr>
+              <a:t>image</a:t>
+            </a:r>
+            <a:endParaRPr lang="es-ES" sz="1600" b="0" dirty="0">
+              <a:solidFill>
+                <a:srgbClr val="CCCCCC"/>
+              </a:solidFill>
+              <a:effectLst/>
+              <a:latin typeface="Consolas" panose="020B0609020204030204" pitchFamily="49" charset="0"/>
+            </a:endParaRPr>
+          </a:p>
+          <a:p>
+            <a:r>
+              <a:rPr lang="es-ES" sz="1600" b="0" dirty="0">
+                <a:solidFill>
+                  <a:srgbClr val="CCCCCC"/>
+                </a:solidFill>
+                <a:effectLst/>
+                <a:latin typeface="Consolas" panose="020B0609020204030204" pitchFamily="49" charset="0"/>
+              </a:rPr>
+              <a:t>    </a:t>
+            </a:r>
+            <a:r>
+              <a:rPr lang="es-ES" sz="1600" b="0" dirty="0" err="1">
+                <a:solidFill>
+                  <a:srgbClr val="9CDCFE"/>
+                </a:solidFill>
+                <a:effectLst/>
+                <a:latin typeface="Consolas" panose="020B0609020204030204" pitchFamily="49" charset="0"/>
+              </a:rPr>
+              <a:t>compressed_coeffs</a:t>
+            </a:r>
+            <a:r>
+              <a:rPr lang="es-ES" sz="1600" b="0" dirty="0">
+                <a:solidFill>
+                  <a:srgbClr val="CCCCCC"/>
+                </a:solidFill>
+                <a:effectLst/>
+                <a:latin typeface="Consolas" panose="020B0609020204030204" pitchFamily="49" charset="0"/>
+              </a:rPr>
+              <a:t> </a:t>
+            </a:r>
+            <a:r>
+              <a:rPr lang="es-ES" sz="1600" b="0" dirty="0">
+                <a:solidFill>
+                  <a:srgbClr val="D4D4D4"/>
+                </a:solidFill>
+                <a:effectLst/>
+                <a:latin typeface="Consolas" panose="020B0609020204030204" pitchFamily="49" charset="0"/>
+              </a:rPr>
+              <a:t>=</a:t>
+            </a:r>
+            <a:r>
+              <a:rPr lang="es-ES" sz="1600" b="0" dirty="0">
+                <a:solidFill>
+                  <a:srgbClr val="CCCCCC"/>
+                </a:solidFill>
+                <a:effectLst/>
+                <a:latin typeface="Consolas" panose="020B0609020204030204" pitchFamily="49" charset="0"/>
+              </a:rPr>
+              <a:t> [</a:t>
+            </a:r>
+            <a:r>
+              <a:rPr lang="es-ES" sz="1600" b="0" dirty="0" err="1">
+                <a:solidFill>
+                  <a:srgbClr val="4EC9B0"/>
+                </a:solidFill>
+                <a:effectLst/>
+                <a:latin typeface="Consolas" panose="020B0609020204030204" pitchFamily="49" charset="0"/>
+              </a:rPr>
+              <a:t>pywt</a:t>
+            </a:r>
+            <a:r>
+              <a:rPr lang="es-ES" sz="1600" b="0" dirty="0" err="1">
+                <a:solidFill>
+                  <a:srgbClr val="CCCCCC"/>
+                </a:solidFill>
+                <a:effectLst/>
+                <a:latin typeface="Consolas" panose="020B0609020204030204" pitchFamily="49" charset="0"/>
+              </a:rPr>
+              <a:t>.</a:t>
+            </a:r>
+            <a:r>
+              <a:rPr lang="es-ES" sz="1600" b="0" dirty="0" err="1">
+                <a:solidFill>
+                  <a:srgbClr val="DCDCAA"/>
+                </a:solidFill>
+                <a:effectLst/>
+                <a:latin typeface="Consolas" panose="020B0609020204030204" pitchFamily="49" charset="0"/>
+              </a:rPr>
+              <a:t>threshold</a:t>
+            </a:r>
+            <a:r>
+              <a:rPr lang="es-ES" sz="1600" b="0" dirty="0">
+                <a:solidFill>
+                  <a:srgbClr val="CCCCCC"/>
+                </a:solidFill>
+                <a:effectLst/>
+                <a:latin typeface="Consolas" panose="020B0609020204030204" pitchFamily="49" charset="0"/>
+              </a:rPr>
+              <a:t>(</a:t>
+            </a:r>
+            <a:r>
+              <a:rPr lang="es-ES" sz="1600" b="0" dirty="0">
+                <a:solidFill>
+                  <a:srgbClr val="9CDCFE"/>
+                </a:solidFill>
+                <a:effectLst/>
+                <a:latin typeface="Consolas" panose="020B0609020204030204" pitchFamily="49" charset="0"/>
+              </a:rPr>
+              <a:t>i</a:t>
+            </a:r>
+            <a:r>
+              <a:rPr lang="es-ES" sz="1600" b="0" dirty="0">
+                <a:solidFill>
+                  <a:srgbClr val="CCCCCC"/>
+                </a:solidFill>
+                <a:effectLst/>
+                <a:latin typeface="Consolas" panose="020B0609020204030204" pitchFamily="49" charset="0"/>
+              </a:rPr>
+              <a:t>, </a:t>
+            </a:r>
+            <a:r>
+              <a:rPr lang="es-ES" sz="1600" b="0" dirty="0" err="1">
+                <a:solidFill>
+                  <a:srgbClr val="9CDCFE"/>
+                </a:solidFill>
+                <a:effectLst/>
+                <a:latin typeface="Consolas" panose="020B0609020204030204" pitchFamily="49" charset="0"/>
+              </a:rPr>
+              <a:t>value</a:t>
+            </a:r>
+            <a:r>
+              <a:rPr lang="es-ES" sz="1600" b="0" dirty="0">
+                <a:solidFill>
+                  <a:srgbClr val="D4D4D4"/>
+                </a:solidFill>
+                <a:effectLst/>
+                <a:latin typeface="Consolas" panose="020B0609020204030204" pitchFamily="49" charset="0"/>
+              </a:rPr>
+              <a:t>=</a:t>
+            </a:r>
+            <a:r>
+              <a:rPr lang="es-ES" sz="1600" b="0" dirty="0">
+                <a:solidFill>
+                  <a:srgbClr val="B5CEA8"/>
+                </a:solidFill>
+                <a:effectLst/>
+                <a:latin typeface="Consolas" panose="020B0609020204030204" pitchFamily="49" charset="0"/>
+              </a:rPr>
+              <a:t>0.1</a:t>
+            </a:r>
+            <a:r>
+              <a:rPr lang="es-ES" sz="1600" b="0" dirty="0">
+                <a:solidFill>
+                  <a:srgbClr val="CCCCCC"/>
+                </a:solidFill>
+                <a:effectLst/>
+                <a:latin typeface="Consolas" panose="020B0609020204030204" pitchFamily="49" charset="0"/>
+              </a:rPr>
+              <a:t>, </a:t>
+            </a:r>
+            <a:r>
+              <a:rPr lang="es-ES" sz="1600" b="0" dirty="0" err="1">
+                <a:solidFill>
+                  <a:srgbClr val="9CDCFE"/>
+                </a:solidFill>
+                <a:effectLst/>
+                <a:latin typeface="Consolas" panose="020B0609020204030204" pitchFamily="49" charset="0"/>
+              </a:rPr>
+              <a:t>mode</a:t>
+            </a:r>
+            <a:r>
+              <a:rPr lang="es-ES" sz="1600" b="0" dirty="0">
+                <a:solidFill>
+                  <a:srgbClr val="D4D4D4"/>
+                </a:solidFill>
+                <a:effectLst/>
+                <a:latin typeface="Consolas" panose="020B0609020204030204" pitchFamily="49" charset="0"/>
+              </a:rPr>
+              <a:t>=</a:t>
+            </a:r>
+            <a:r>
+              <a:rPr lang="es-ES" sz="1600" b="0" dirty="0">
+                <a:solidFill>
+                  <a:srgbClr val="CE9178"/>
+                </a:solidFill>
+                <a:effectLst/>
+                <a:latin typeface="Consolas" panose="020B0609020204030204" pitchFamily="49" charset="0"/>
+              </a:rPr>
+              <a:t>‘</a:t>
+            </a:r>
+            <a:r>
+              <a:rPr lang="es-ES" sz="1600" b="0" dirty="0" err="1">
+                <a:solidFill>
+                  <a:srgbClr val="CE9178"/>
+                </a:solidFill>
+                <a:effectLst/>
+                <a:latin typeface="Consolas" panose="020B0609020204030204" pitchFamily="49" charset="0"/>
+              </a:rPr>
+              <a:t>soft</a:t>
+            </a:r>
+            <a:r>
+              <a:rPr lang="es-ES" sz="1600" b="0" dirty="0">
+                <a:solidFill>
+                  <a:srgbClr val="CE9178"/>
+                </a:solidFill>
+                <a:effectLst/>
+                <a:latin typeface="Consolas" panose="020B0609020204030204" pitchFamily="49" charset="0"/>
+              </a:rPr>
+              <a:t>'</a:t>
+            </a:r>
+            <a:r>
+              <a:rPr lang="es-ES" sz="1600" b="0" dirty="0">
+                <a:solidFill>
+                  <a:srgbClr val="CCCCCC"/>
+                </a:solidFill>
+                <a:effectLst/>
+                <a:latin typeface="Consolas" panose="020B0609020204030204" pitchFamily="49" charset="0"/>
+              </a:rPr>
+              <a:t>) </a:t>
+            </a:r>
+            <a:r>
+              <a:rPr lang="es-ES" sz="1600" b="0" dirty="0" err="1">
+                <a:solidFill>
+                  <a:srgbClr val="C586C0"/>
+                </a:solidFill>
+                <a:effectLst/>
+                <a:latin typeface="Consolas" panose="020B0609020204030204" pitchFamily="49" charset="0"/>
+              </a:rPr>
+              <a:t>for</a:t>
+            </a:r>
+            <a:r>
+              <a:rPr lang="es-ES" sz="1600" b="0" dirty="0">
+                <a:solidFill>
+                  <a:srgbClr val="CCCCCC"/>
+                </a:solidFill>
+                <a:effectLst/>
+                <a:latin typeface="Consolas" panose="020B0609020204030204" pitchFamily="49" charset="0"/>
+              </a:rPr>
+              <a:t> </a:t>
+            </a:r>
+            <a:r>
+              <a:rPr lang="es-ES" sz="1600" b="0" dirty="0">
+                <a:solidFill>
+                  <a:srgbClr val="9CDCFE"/>
+                </a:solidFill>
+                <a:effectLst/>
+                <a:latin typeface="Consolas" panose="020B0609020204030204" pitchFamily="49" charset="0"/>
+              </a:rPr>
+              <a:t>i</a:t>
+            </a:r>
+            <a:r>
+              <a:rPr lang="es-ES" sz="1600" b="0" dirty="0">
+                <a:solidFill>
+                  <a:srgbClr val="CCCCCC"/>
+                </a:solidFill>
+                <a:effectLst/>
+                <a:latin typeface="Consolas" panose="020B0609020204030204" pitchFamily="49" charset="0"/>
+              </a:rPr>
+              <a:t> </a:t>
+            </a:r>
+            <a:r>
+              <a:rPr lang="es-ES" sz="1600" b="0" dirty="0">
+                <a:solidFill>
+                  <a:srgbClr val="C586C0"/>
+                </a:solidFill>
+                <a:effectLst/>
+                <a:latin typeface="Consolas" panose="020B0609020204030204" pitchFamily="49" charset="0"/>
+              </a:rPr>
+              <a:t>in</a:t>
+            </a:r>
+            <a:r>
+              <a:rPr lang="es-ES" sz="1600" b="0" dirty="0">
+                <a:solidFill>
+                  <a:srgbClr val="CCCCCC"/>
+                </a:solidFill>
+                <a:effectLst/>
+                <a:latin typeface="Consolas" panose="020B0609020204030204" pitchFamily="49" charset="0"/>
+              </a:rPr>
+              <a:t> </a:t>
+            </a:r>
+            <a:r>
+              <a:rPr lang="es-ES" sz="1600" b="0" dirty="0" err="1">
+                <a:solidFill>
+                  <a:srgbClr val="9CDCFE"/>
+                </a:solidFill>
+                <a:effectLst/>
+                <a:latin typeface="Consolas" panose="020B0609020204030204" pitchFamily="49" charset="0"/>
+              </a:rPr>
+              <a:t>coeffs</a:t>
+            </a:r>
+            <a:r>
+              <a:rPr lang="es-ES" sz="1600" b="0" dirty="0">
+                <a:solidFill>
+                  <a:srgbClr val="CCCCCC"/>
+                </a:solidFill>
+                <a:effectLst/>
+                <a:latin typeface="Consolas" panose="020B0609020204030204" pitchFamily="49" charset="0"/>
+              </a:rPr>
+              <a:t>]</a:t>
+            </a:r>
+          </a:p>
+          <a:p>
+            <a:r>
+              <a:rPr lang="es-ES" sz="1600" b="0" dirty="0">
+                <a:solidFill>
+                  <a:srgbClr val="CCCCCC"/>
+                </a:solidFill>
+                <a:effectLst/>
+                <a:latin typeface="Consolas" panose="020B0609020204030204" pitchFamily="49" charset="0"/>
+              </a:rPr>
+              <a:t>    </a:t>
+            </a:r>
+            <a:r>
+              <a:rPr lang="es-ES" sz="1600" b="0" dirty="0">
+                <a:solidFill>
+                  <a:srgbClr val="6A9955"/>
+                </a:solidFill>
+                <a:effectLst/>
+                <a:latin typeface="Consolas" panose="020B0609020204030204" pitchFamily="49" charset="0"/>
+              </a:rPr>
+              <a:t># </a:t>
+            </a:r>
+            <a:r>
+              <a:rPr lang="es-ES" sz="1600" b="0" dirty="0" err="1">
+                <a:solidFill>
+                  <a:srgbClr val="6A9955"/>
+                </a:solidFill>
+                <a:effectLst/>
+                <a:latin typeface="Consolas" panose="020B0609020204030204" pitchFamily="49" charset="0"/>
+              </a:rPr>
+              <a:t>Reconstruct</a:t>
+            </a:r>
+            <a:r>
+              <a:rPr lang="es-ES" sz="1600" b="0" dirty="0">
+                <a:solidFill>
+                  <a:srgbClr val="6A9955"/>
+                </a:solidFill>
+                <a:effectLst/>
+                <a:latin typeface="Consolas" panose="020B0609020204030204" pitchFamily="49" charset="0"/>
+              </a:rPr>
+              <a:t> </a:t>
+            </a:r>
+            <a:r>
+              <a:rPr lang="es-ES" sz="1600" b="0" dirty="0" err="1">
+                <a:solidFill>
+                  <a:srgbClr val="6A9955"/>
+                </a:solidFill>
+                <a:effectLst/>
+                <a:latin typeface="Consolas" panose="020B0609020204030204" pitchFamily="49" charset="0"/>
+              </a:rPr>
+              <a:t>the</a:t>
+            </a:r>
+            <a:r>
+              <a:rPr lang="es-ES" sz="1600" b="0" dirty="0">
+                <a:solidFill>
+                  <a:srgbClr val="6A9955"/>
+                </a:solidFill>
+                <a:effectLst/>
+                <a:latin typeface="Consolas" panose="020B0609020204030204" pitchFamily="49" charset="0"/>
+              </a:rPr>
+              <a:t> </a:t>
+            </a:r>
+            <a:r>
+              <a:rPr lang="es-ES" sz="1600" b="0" dirty="0" err="1">
+                <a:solidFill>
+                  <a:srgbClr val="6A9955"/>
+                </a:solidFill>
+                <a:effectLst/>
+                <a:latin typeface="Consolas" panose="020B0609020204030204" pitchFamily="49" charset="0"/>
+              </a:rPr>
+              <a:t>compressed</a:t>
+            </a:r>
+            <a:r>
+              <a:rPr lang="es-ES" sz="1600" b="0" dirty="0">
+                <a:solidFill>
+                  <a:srgbClr val="6A9955"/>
+                </a:solidFill>
+                <a:effectLst/>
+                <a:latin typeface="Consolas" panose="020B0609020204030204" pitchFamily="49" charset="0"/>
+              </a:rPr>
+              <a:t> </a:t>
+            </a:r>
+            <a:r>
+              <a:rPr lang="es-ES" sz="1600" b="0" dirty="0" err="1">
+                <a:solidFill>
+                  <a:srgbClr val="6A9955"/>
+                </a:solidFill>
+                <a:effectLst/>
+                <a:latin typeface="Consolas" panose="020B0609020204030204" pitchFamily="49" charset="0"/>
+              </a:rPr>
+              <a:t>image</a:t>
+            </a:r>
+            <a:endParaRPr lang="es-ES" sz="1600" b="0" dirty="0">
+              <a:solidFill>
+                <a:srgbClr val="CCCCCC"/>
+              </a:solidFill>
+              <a:effectLst/>
+              <a:latin typeface="Consolas" panose="020B0609020204030204" pitchFamily="49" charset="0"/>
+            </a:endParaRPr>
+          </a:p>
+          <a:p>
+            <a:r>
+              <a:rPr lang="es-ES" sz="1600" b="0" dirty="0">
+                <a:solidFill>
+                  <a:srgbClr val="CCCCCC"/>
+                </a:solidFill>
+                <a:effectLst/>
+                <a:latin typeface="Consolas" panose="020B0609020204030204" pitchFamily="49" charset="0"/>
+              </a:rPr>
+              <a:t>    </a:t>
+            </a:r>
+            <a:r>
+              <a:rPr lang="es-ES" sz="1600" b="0" dirty="0" err="1">
+                <a:solidFill>
+                  <a:srgbClr val="9CDCFE"/>
+                </a:solidFill>
+                <a:effectLst/>
+                <a:latin typeface="Consolas" panose="020B0609020204030204" pitchFamily="49" charset="0"/>
+              </a:rPr>
+              <a:t>compressed_image</a:t>
+            </a:r>
+            <a:r>
+              <a:rPr lang="es-ES" sz="1600" b="0" dirty="0">
+                <a:solidFill>
+                  <a:srgbClr val="CCCCCC"/>
+                </a:solidFill>
+                <a:effectLst/>
+                <a:latin typeface="Consolas" panose="020B0609020204030204" pitchFamily="49" charset="0"/>
+              </a:rPr>
+              <a:t> </a:t>
+            </a:r>
+            <a:r>
+              <a:rPr lang="es-ES" sz="1600" b="0" dirty="0">
+                <a:solidFill>
+                  <a:srgbClr val="D4D4D4"/>
+                </a:solidFill>
+                <a:effectLst/>
+                <a:latin typeface="Consolas" panose="020B0609020204030204" pitchFamily="49" charset="0"/>
+              </a:rPr>
+              <a:t>=</a:t>
+            </a:r>
+            <a:r>
+              <a:rPr lang="es-ES" sz="1600" b="0" dirty="0">
+                <a:solidFill>
+                  <a:srgbClr val="CCCCCC"/>
+                </a:solidFill>
+                <a:effectLst/>
+                <a:latin typeface="Consolas" panose="020B0609020204030204" pitchFamily="49" charset="0"/>
+              </a:rPr>
+              <a:t> </a:t>
+            </a:r>
+            <a:r>
+              <a:rPr lang="es-ES" sz="1600" b="0" dirty="0">
+                <a:solidFill>
+                  <a:srgbClr val="4EC9B0"/>
+                </a:solidFill>
+                <a:effectLst/>
+                <a:latin typeface="Consolas" panose="020B0609020204030204" pitchFamily="49" charset="0"/>
+              </a:rPr>
+              <a:t>pywt</a:t>
+            </a:r>
+            <a:r>
+              <a:rPr lang="es-ES" sz="1600" b="0" dirty="0">
+                <a:solidFill>
+                  <a:srgbClr val="CCCCCC"/>
+                </a:solidFill>
+                <a:effectLst/>
+                <a:latin typeface="Consolas" panose="020B0609020204030204" pitchFamily="49" charset="0"/>
+              </a:rPr>
+              <a:t>.</a:t>
+            </a:r>
+            <a:r>
+              <a:rPr lang="es-ES" sz="1600" b="0" dirty="0">
+                <a:solidFill>
+                  <a:srgbClr val="DCDCAA"/>
+                </a:solidFill>
+                <a:effectLst/>
+                <a:latin typeface="Consolas" panose="020B0609020204030204" pitchFamily="49" charset="0"/>
+              </a:rPr>
+              <a:t>idwt2</a:t>
+            </a:r>
+            <a:r>
+              <a:rPr lang="es-ES" sz="1600" b="0" dirty="0">
+                <a:solidFill>
+                  <a:srgbClr val="CCCCCC"/>
+                </a:solidFill>
+                <a:effectLst/>
+                <a:latin typeface="Consolas" panose="020B0609020204030204" pitchFamily="49" charset="0"/>
+              </a:rPr>
+              <a:t>(</a:t>
+            </a:r>
+            <a:r>
+              <a:rPr lang="es-ES" sz="1600" b="0" dirty="0" err="1">
+                <a:solidFill>
+                  <a:srgbClr val="9CDCFE"/>
+                </a:solidFill>
+                <a:effectLst/>
+                <a:latin typeface="Consolas" panose="020B0609020204030204" pitchFamily="49" charset="0"/>
+              </a:rPr>
+              <a:t>compressed_coeffs</a:t>
+            </a:r>
+            <a:r>
+              <a:rPr lang="es-ES" sz="1600" b="0" dirty="0">
+                <a:solidFill>
+                  <a:srgbClr val="CCCCCC"/>
+                </a:solidFill>
+                <a:effectLst/>
+                <a:latin typeface="Consolas" panose="020B0609020204030204" pitchFamily="49" charset="0"/>
+              </a:rPr>
+              <a:t>, </a:t>
+            </a:r>
+            <a:r>
+              <a:rPr lang="es-ES" sz="1600" b="0" dirty="0" err="1">
+                <a:solidFill>
+                  <a:srgbClr val="9CDCFE"/>
+                </a:solidFill>
+                <a:effectLst/>
+                <a:latin typeface="Consolas" panose="020B0609020204030204" pitchFamily="49" charset="0"/>
+              </a:rPr>
+              <a:t>wavelet_family</a:t>
+            </a:r>
+            <a:r>
+              <a:rPr lang="es-ES" sz="1600" b="0" dirty="0">
+                <a:solidFill>
+                  <a:srgbClr val="CCCCCC"/>
+                </a:solidFill>
+                <a:effectLst/>
+                <a:latin typeface="Consolas" panose="020B0609020204030204" pitchFamily="49" charset="0"/>
+              </a:rPr>
+              <a:t>)</a:t>
+            </a:r>
+          </a:p>
+          <a:p>
+            <a:r>
+              <a:rPr lang="es-ES" sz="1600" b="0" dirty="0">
+                <a:solidFill>
+                  <a:srgbClr val="CCCCCC"/>
+                </a:solidFill>
+                <a:effectLst/>
+                <a:latin typeface="Consolas" panose="020B0609020204030204" pitchFamily="49" charset="0"/>
+              </a:rPr>
+              <a:t>    </a:t>
+            </a:r>
+            <a:r>
+              <a:rPr lang="es-ES" sz="1600" b="0" dirty="0">
+                <a:solidFill>
+                  <a:srgbClr val="6A9955"/>
+                </a:solidFill>
+                <a:effectLst/>
+                <a:latin typeface="Consolas" panose="020B0609020204030204" pitchFamily="49" charset="0"/>
+              </a:rPr>
+              <a:t># </a:t>
+            </a:r>
+            <a:r>
+              <a:rPr lang="es-ES" sz="1600" b="0" dirty="0" err="1">
+                <a:solidFill>
+                  <a:srgbClr val="6A9955"/>
+                </a:solidFill>
+                <a:effectLst/>
+                <a:latin typeface="Consolas" panose="020B0609020204030204" pitchFamily="49" charset="0"/>
+              </a:rPr>
+              <a:t>Convert</a:t>
+            </a:r>
+            <a:r>
+              <a:rPr lang="es-ES" sz="1600" b="0" dirty="0">
+                <a:solidFill>
+                  <a:srgbClr val="6A9955"/>
+                </a:solidFill>
+                <a:effectLst/>
+                <a:latin typeface="Consolas" panose="020B0609020204030204" pitchFamily="49" charset="0"/>
+              </a:rPr>
+              <a:t> </a:t>
+            </a:r>
+            <a:r>
+              <a:rPr lang="es-ES" sz="1600" b="0" dirty="0" err="1">
+                <a:solidFill>
+                  <a:srgbClr val="6A9955"/>
+                </a:solidFill>
+                <a:effectLst/>
+                <a:latin typeface="Consolas" panose="020B0609020204030204" pitchFamily="49" charset="0"/>
+              </a:rPr>
+              <a:t>the</a:t>
+            </a:r>
+            <a:r>
+              <a:rPr lang="es-ES" sz="1600" b="0" dirty="0">
+                <a:solidFill>
+                  <a:srgbClr val="6A9955"/>
+                </a:solidFill>
+                <a:effectLst/>
+                <a:latin typeface="Consolas" panose="020B0609020204030204" pitchFamily="49" charset="0"/>
+              </a:rPr>
+              <a:t> </a:t>
+            </a:r>
+            <a:r>
+              <a:rPr lang="es-ES" sz="1600" b="0" dirty="0" err="1">
+                <a:solidFill>
+                  <a:srgbClr val="6A9955"/>
+                </a:solidFill>
+                <a:effectLst/>
+                <a:latin typeface="Consolas" panose="020B0609020204030204" pitchFamily="49" charset="0"/>
+              </a:rPr>
+              <a:t>numpy</a:t>
+            </a:r>
+            <a:r>
+              <a:rPr lang="es-ES" sz="1600" b="0" dirty="0">
+                <a:solidFill>
+                  <a:srgbClr val="6A9955"/>
+                </a:solidFill>
+                <a:effectLst/>
+                <a:latin typeface="Consolas" panose="020B0609020204030204" pitchFamily="49" charset="0"/>
+              </a:rPr>
+              <a:t> array back </a:t>
+            </a:r>
+            <a:r>
+              <a:rPr lang="es-ES" sz="1600" b="0" dirty="0" err="1">
+                <a:solidFill>
+                  <a:srgbClr val="6A9955"/>
+                </a:solidFill>
+                <a:effectLst/>
+                <a:latin typeface="Consolas" panose="020B0609020204030204" pitchFamily="49" charset="0"/>
+              </a:rPr>
+              <a:t>to</a:t>
+            </a:r>
+            <a:r>
+              <a:rPr lang="es-ES" sz="1600" b="0" dirty="0">
+                <a:solidFill>
+                  <a:srgbClr val="6A9955"/>
+                </a:solidFill>
+                <a:effectLst/>
+                <a:latin typeface="Consolas" panose="020B0609020204030204" pitchFamily="49" charset="0"/>
+              </a:rPr>
+              <a:t> </a:t>
+            </a:r>
+            <a:r>
+              <a:rPr lang="es-ES" sz="1600" b="0" dirty="0" err="1">
+                <a:solidFill>
+                  <a:srgbClr val="6A9955"/>
+                </a:solidFill>
+                <a:effectLst/>
+                <a:latin typeface="Consolas" panose="020B0609020204030204" pitchFamily="49" charset="0"/>
+              </a:rPr>
+              <a:t>an</a:t>
+            </a:r>
+            <a:r>
+              <a:rPr lang="es-ES" sz="1600" b="0" dirty="0">
+                <a:solidFill>
+                  <a:srgbClr val="6A9955"/>
+                </a:solidFill>
+                <a:effectLst/>
+                <a:latin typeface="Consolas" panose="020B0609020204030204" pitchFamily="49" charset="0"/>
+              </a:rPr>
+              <a:t> </a:t>
+            </a:r>
+            <a:r>
+              <a:rPr lang="es-ES" sz="1600" b="0" dirty="0" err="1">
+                <a:solidFill>
+                  <a:srgbClr val="6A9955"/>
+                </a:solidFill>
+                <a:effectLst/>
+                <a:latin typeface="Consolas" panose="020B0609020204030204" pitchFamily="49" charset="0"/>
+              </a:rPr>
+              <a:t>image</a:t>
+            </a:r>
+            <a:endParaRPr lang="es-ES" sz="1600" b="0" dirty="0">
+              <a:solidFill>
+                <a:srgbClr val="CCCCCC"/>
+              </a:solidFill>
+              <a:effectLst/>
+              <a:latin typeface="Consolas" panose="020B0609020204030204" pitchFamily="49" charset="0"/>
+            </a:endParaRPr>
+          </a:p>
+          <a:p>
+            <a:r>
+              <a:rPr lang="es-ES" sz="1600" b="0" dirty="0">
+                <a:solidFill>
+                  <a:srgbClr val="CCCCCC"/>
+                </a:solidFill>
+                <a:effectLst/>
+                <a:latin typeface="Consolas" panose="020B0609020204030204" pitchFamily="49" charset="0"/>
+              </a:rPr>
+              <a:t>    </a:t>
+            </a:r>
+            <a:r>
+              <a:rPr lang="es-ES" sz="1600" b="0" dirty="0" err="1">
+                <a:solidFill>
+                  <a:srgbClr val="9CDCFE"/>
+                </a:solidFill>
+                <a:effectLst/>
+                <a:latin typeface="Consolas" panose="020B0609020204030204" pitchFamily="49" charset="0"/>
+              </a:rPr>
+              <a:t>compressed_image</a:t>
+            </a:r>
+            <a:r>
+              <a:rPr lang="es-ES" sz="1600" b="0" dirty="0">
+                <a:solidFill>
+                  <a:srgbClr val="CCCCCC"/>
+                </a:solidFill>
+                <a:effectLst/>
+                <a:latin typeface="Consolas" panose="020B0609020204030204" pitchFamily="49" charset="0"/>
+              </a:rPr>
+              <a:t> </a:t>
+            </a:r>
+            <a:r>
+              <a:rPr lang="es-ES" sz="1600" b="0" dirty="0">
+                <a:solidFill>
+                  <a:srgbClr val="D4D4D4"/>
+                </a:solidFill>
+                <a:effectLst/>
+                <a:latin typeface="Consolas" panose="020B0609020204030204" pitchFamily="49" charset="0"/>
+              </a:rPr>
+              <a:t>=</a:t>
+            </a:r>
+            <a:r>
+              <a:rPr lang="es-ES" sz="1600" b="0" dirty="0">
+                <a:solidFill>
+                  <a:srgbClr val="CCCCCC"/>
+                </a:solidFill>
+                <a:effectLst/>
+                <a:latin typeface="Consolas" panose="020B0609020204030204" pitchFamily="49" charset="0"/>
+              </a:rPr>
+              <a:t> </a:t>
+            </a:r>
+            <a:r>
+              <a:rPr lang="es-ES" sz="1600" b="0" dirty="0" err="1">
+                <a:solidFill>
+                  <a:srgbClr val="4EC9B0"/>
+                </a:solidFill>
+                <a:effectLst/>
+                <a:latin typeface="Consolas" panose="020B0609020204030204" pitchFamily="49" charset="0"/>
+              </a:rPr>
+              <a:t>Image</a:t>
+            </a:r>
+            <a:r>
+              <a:rPr lang="es-ES" sz="1600" b="0" dirty="0" err="1">
+                <a:solidFill>
+                  <a:srgbClr val="CCCCCC"/>
+                </a:solidFill>
+                <a:effectLst/>
+                <a:latin typeface="Consolas" panose="020B0609020204030204" pitchFamily="49" charset="0"/>
+              </a:rPr>
+              <a:t>.</a:t>
+            </a:r>
+            <a:r>
+              <a:rPr lang="es-ES" sz="1600" b="0" dirty="0" err="1">
+                <a:solidFill>
+                  <a:srgbClr val="DCDCAA"/>
+                </a:solidFill>
+                <a:effectLst/>
+                <a:latin typeface="Consolas" panose="020B0609020204030204" pitchFamily="49" charset="0"/>
+              </a:rPr>
+              <a:t>fromarray</a:t>
+            </a:r>
+            <a:r>
+              <a:rPr lang="es-ES" sz="1600" b="0" dirty="0">
+                <a:solidFill>
+                  <a:srgbClr val="CCCCCC"/>
+                </a:solidFill>
+                <a:effectLst/>
+                <a:latin typeface="Consolas" panose="020B0609020204030204" pitchFamily="49" charset="0"/>
+              </a:rPr>
+              <a:t>(</a:t>
+            </a:r>
+            <a:r>
+              <a:rPr lang="es-ES" sz="1600" b="0" dirty="0">
+                <a:solidFill>
+                  <a:srgbClr val="4EC9B0"/>
+                </a:solidFill>
+                <a:effectLst/>
+                <a:latin typeface="Consolas" panose="020B0609020204030204" pitchFamily="49" charset="0"/>
+              </a:rPr>
+              <a:t>np</a:t>
+            </a:r>
+            <a:r>
+              <a:rPr lang="es-ES" sz="1600" b="0" dirty="0">
+                <a:solidFill>
+                  <a:srgbClr val="CCCCCC"/>
+                </a:solidFill>
+                <a:effectLst/>
+                <a:latin typeface="Consolas" panose="020B0609020204030204" pitchFamily="49" charset="0"/>
+              </a:rPr>
+              <a:t>.</a:t>
+            </a:r>
+            <a:r>
+              <a:rPr lang="es-ES" sz="1600" b="0" dirty="0">
+                <a:solidFill>
+                  <a:srgbClr val="9CDCFE"/>
+                </a:solidFill>
+                <a:effectLst/>
+                <a:latin typeface="Consolas" panose="020B0609020204030204" pitchFamily="49" charset="0"/>
+              </a:rPr>
+              <a:t>uint8</a:t>
+            </a:r>
+            <a:r>
+              <a:rPr lang="es-ES" sz="1600" b="0" dirty="0">
+                <a:solidFill>
+                  <a:srgbClr val="CCCCCC"/>
+                </a:solidFill>
+                <a:effectLst/>
+                <a:latin typeface="Consolas" panose="020B0609020204030204" pitchFamily="49" charset="0"/>
+              </a:rPr>
+              <a:t>(</a:t>
+            </a:r>
+            <a:r>
+              <a:rPr lang="es-ES" sz="1600" b="0" dirty="0" err="1">
+                <a:solidFill>
+                  <a:srgbClr val="9CDCFE"/>
+                </a:solidFill>
+                <a:effectLst/>
+                <a:latin typeface="Consolas" panose="020B0609020204030204" pitchFamily="49" charset="0"/>
+              </a:rPr>
+              <a:t>compressed_image</a:t>
+            </a:r>
+            <a:r>
+              <a:rPr lang="es-ES" sz="1600" b="0" dirty="0">
+                <a:solidFill>
+                  <a:srgbClr val="CCCCCC"/>
+                </a:solidFill>
+                <a:effectLst/>
+                <a:latin typeface="Consolas" panose="020B0609020204030204" pitchFamily="49" charset="0"/>
+              </a:rPr>
+              <a:t>))</a:t>
+            </a:r>
+          </a:p>
+          <a:p>
+            <a:r>
+              <a:rPr lang="es-ES" sz="1600" b="0" dirty="0">
+                <a:solidFill>
+                  <a:srgbClr val="CCCCCC"/>
+                </a:solidFill>
+                <a:effectLst/>
+                <a:latin typeface="Consolas" panose="020B0609020204030204" pitchFamily="49" charset="0"/>
+              </a:rPr>
+              <a:t>    </a:t>
+            </a:r>
+            <a:r>
+              <a:rPr lang="es-ES" sz="1600" b="0" dirty="0" err="1">
+                <a:solidFill>
+                  <a:srgbClr val="C586C0"/>
+                </a:solidFill>
+                <a:effectLst/>
+                <a:latin typeface="Consolas" panose="020B0609020204030204" pitchFamily="49" charset="0"/>
+              </a:rPr>
+              <a:t>return</a:t>
+            </a:r>
+            <a:r>
+              <a:rPr lang="es-ES" sz="1600" b="0" dirty="0">
+                <a:solidFill>
+                  <a:srgbClr val="CCCCCC"/>
+                </a:solidFill>
+                <a:effectLst/>
+                <a:latin typeface="Consolas" panose="020B0609020204030204" pitchFamily="49" charset="0"/>
+              </a:rPr>
+              <a:t> </a:t>
+            </a:r>
+            <a:r>
+              <a:rPr lang="es-ES" sz="1600" b="0" dirty="0" err="1">
+                <a:solidFill>
+                  <a:srgbClr val="9CDCFE"/>
+                </a:solidFill>
+                <a:effectLst/>
+                <a:latin typeface="Consolas" panose="020B0609020204030204" pitchFamily="49" charset="0"/>
+              </a:rPr>
+              <a:t>compressed_image</a:t>
+            </a:r>
+            <a:endParaRPr lang="es-ES" sz="1600" b="0" dirty="0">
+              <a:solidFill>
+                <a:srgbClr val="CCCCCC"/>
+              </a:solidFill>
+              <a:effectLst/>
+              <a:latin typeface="Consolas" panose="020B0609020204030204" pitchFamily="49" charset="0"/>
+            </a:endParaRPr>
+          </a:p>
+          <a:p>
+            <a:br>
+              <a:rPr lang="es-ES" sz="1600" b="0" dirty="0">
+                <a:solidFill>
+                  <a:srgbClr val="CCCCCC"/>
+                </a:solidFill>
+                <a:effectLst/>
+                <a:latin typeface="Consolas" panose="020B0609020204030204" pitchFamily="49" charset="0"/>
+              </a:rPr>
+            </a:br>
+            <a:r>
+              <a:rPr lang="es-ES" sz="1600" b="0" dirty="0">
+                <a:solidFill>
+                  <a:srgbClr val="6A9955"/>
+                </a:solidFill>
+                <a:effectLst/>
+                <a:latin typeface="Consolas" panose="020B0609020204030204" pitchFamily="49" charset="0"/>
+              </a:rPr>
+              <a:t># </a:t>
+            </a:r>
+            <a:r>
+              <a:rPr lang="es-ES" sz="1600" b="0" dirty="0" err="1">
+                <a:solidFill>
+                  <a:srgbClr val="6A9955"/>
+                </a:solidFill>
+                <a:effectLst/>
+                <a:latin typeface="Consolas" panose="020B0609020204030204" pitchFamily="49" charset="0"/>
+              </a:rPr>
+              <a:t>Example</a:t>
+            </a:r>
+            <a:r>
+              <a:rPr lang="es-ES" sz="1600" b="0" dirty="0">
+                <a:solidFill>
+                  <a:srgbClr val="6A9955"/>
+                </a:solidFill>
+                <a:effectLst/>
+                <a:latin typeface="Consolas" panose="020B0609020204030204" pitchFamily="49" charset="0"/>
+              </a:rPr>
+              <a:t> </a:t>
+            </a:r>
+            <a:r>
+              <a:rPr lang="es-ES" sz="1600" b="0" dirty="0" err="1">
+                <a:solidFill>
+                  <a:srgbClr val="6A9955"/>
+                </a:solidFill>
+                <a:effectLst/>
+                <a:latin typeface="Consolas" panose="020B0609020204030204" pitchFamily="49" charset="0"/>
+              </a:rPr>
+              <a:t>usage</a:t>
+            </a:r>
+            <a:r>
+              <a:rPr lang="es-ES" sz="1600" b="0" dirty="0">
+                <a:solidFill>
+                  <a:srgbClr val="6A9955"/>
+                </a:solidFill>
+                <a:effectLst/>
+                <a:latin typeface="Consolas" panose="020B0609020204030204" pitchFamily="49" charset="0"/>
+              </a:rPr>
+              <a:t>:</a:t>
+            </a:r>
+            <a:endParaRPr lang="es-ES" sz="1600" b="0" dirty="0">
+              <a:solidFill>
+                <a:srgbClr val="CCCCCC"/>
+              </a:solidFill>
+              <a:effectLst/>
+              <a:latin typeface="Consolas" panose="020B0609020204030204" pitchFamily="49" charset="0"/>
+            </a:endParaRPr>
+          </a:p>
+          <a:p>
+            <a:r>
+              <a:rPr lang="es-ES" sz="1600" b="0" dirty="0" err="1">
+                <a:solidFill>
+                  <a:srgbClr val="9CDCFE"/>
+                </a:solidFill>
+                <a:effectLst/>
+                <a:latin typeface="Consolas" panose="020B0609020204030204" pitchFamily="49" charset="0"/>
+              </a:rPr>
+              <a:t>image_path</a:t>
+            </a:r>
+            <a:r>
+              <a:rPr lang="es-ES" sz="1600" b="0" dirty="0">
+                <a:solidFill>
+                  <a:srgbClr val="CCCCCC"/>
+                </a:solidFill>
+                <a:effectLst/>
+                <a:latin typeface="Consolas" panose="020B0609020204030204" pitchFamily="49" charset="0"/>
+              </a:rPr>
+              <a:t> </a:t>
+            </a:r>
+            <a:r>
+              <a:rPr lang="es-ES" sz="1600" b="0" dirty="0">
+                <a:solidFill>
+                  <a:srgbClr val="D4D4D4"/>
+                </a:solidFill>
+                <a:effectLst/>
+                <a:latin typeface="Consolas" panose="020B0609020204030204" pitchFamily="49" charset="0"/>
+              </a:rPr>
+              <a:t>=</a:t>
+            </a:r>
+            <a:r>
+              <a:rPr lang="es-ES" sz="1600" b="0" dirty="0">
+                <a:solidFill>
+                  <a:srgbClr val="CCCCCC"/>
+                </a:solidFill>
+                <a:effectLst/>
+                <a:latin typeface="Consolas" panose="020B0609020204030204" pitchFamily="49" charset="0"/>
+              </a:rPr>
+              <a:t> </a:t>
+            </a:r>
+            <a:r>
+              <a:rPr lang="es-ES" sz="1600" b="0" dirty="0">
+                <a:solidFill>
+                  <a:srgbClr val="CE9178"/>
+                </a:solidFill>
+                <a:effectLst/>
+                <a:latin typeface="Consolas" panose="020B0609020204030204" pitchFamily="49" charset="0"/>
+              </a:rPr>
+              <a:t>'data/Lena.png'</a:t>
+            </a:r>
+            <a:endParaRPr lang="es-ES" sz="1600" b="0" dirty="0">
+              <a:solidFill>
+                <a:srgbClr val="CCCCCC"/>
+              </a:solidFill>
+              <a:effectLst/>
+              <a:latin typeface="Consolas" panose="020B0609020204030204" pitchFamily="49" charset="0"/>
+            </a:endParaRPr>
+          </a:p>
+          <a:p>
+            <a:r>
+              <a:rPr lang="es-ES" sz="1600" b="0" dirty="0" err="1">
+                <a:solidFill>
+                  <a:srgbClr val="9CDCFE"/>
+                </a:solidFill>
+                <a:effectLst/>
+                <a:latin typeface="Consolas" panose="020B0609020204030204" pitchFamily="49" charset="0"/>
+              </a:rPr>
+              <a:t>wavelet_family</a:t>
+            </a:r>
+            <a:r>
+              <a:rPr lang="es-ES" sz="1600" b="0" dirty="0">
+                <a:solidFill>
+                  <a:srgbClr val="CCCCCC"/>
+                </a:solidFill>
+                <a:effectLst/>
+                <a:latin typeface="Consolas" panose="020B0609020204030204" pitchFamily="49" charset="0"/>
+              </a:rPr>
+              <a:t> </a:t>
+            </a:r>
+            <a:r>
+              <a:rPr lang="es-ES" sz="1600" b="0" dirty="0">
+                <a:solidFill>
+                  <a:srgbClr val="D4D4D4"/>
+                </a:solidFill>
+                <a:effectLst/>
+                <a:latin typeface="Consolas" panose="020B0609020204030204" pitchFamily="49" charset="0"/>
+              </a:rPr>
+              <a:t>=</a:t>
+            </a:r>
+            <a:r>
+              <a:rPr lang="es-ES" sz="1600" b="0" dirty="0">
+                <a:solidFill>
+                  <a:srgbClr val="CCCCCC"/>
+                </a:solidFill>
+                <a:effectLst/>
+                <a:latin typeface="Consolas" panose="020B0609020204030204" pitchFamily="49" charset="0"/>
+              </a:rPr>
+              <a:t> </a:t>
+            </a:r>
+            <a:r>
+              <a:rPr lang="es-ES" sz="1600" b="0" dirty="0">
+                <a:solidFill>
+                  <a:srgbClr val="CE9178"/>
+                </a:solidFill>
+                <a:effectLst/>
+                <a:latin typeface="Consolas" panose="020B0609020204030204" pitchFamily="49" charset="0"/>
+              </a:rPr>
+              <a:t>'</a:t>
+            </a:r>
+            <a:r>
+              <a:rPr lang="es-ES" sz="1600" b="0" dirty="0" err="1">
+                <a:solidFill>
+                  <a:srgbClr val="CE9178"/>
+                </a:solidFill>
+                <a:effectLst/>
+                <a:latin typeface="Consolas" panose="020B0609020204030204" pitchFamily="49" charset="0"/>
+              </a:rPr>
+              <a:t>haar</a:t>
+            </a:r>
+            <a:r>
+              <a:rPr lang="es-ES" sz="1600" b="0" dirty="0">
+                <a:solidFill>
+                  <a:srgbClr val="CE9178"/>
+                </a:solidFill>
+                <a:effectLst/>
+                <a:latin typeface="Consolas" panose="020B0609020204030204" pitchFamily="49" charset="0"/>
+              </a:rPr>
+              <a:t>'</a:t>
+            </a:r>
+            <a:endParaRPr lang="es-ES" sz="1600" b="0" dirty="0">
+              <a:solidFill>
+                <a:srgbClr val="CCCCCC"/>
+              </a:solidFill>
+              <a:effectLst/>
+              <a:latin typeface="Consolas" panose="020B0609020204030204" pitchFamily="49" charset="0"/>
+            </a:endParaRPr>
+          </a:p>
+          <a:p>
+            <a:r>
+              <a:rPr lang="es-ES" sz="1600" b="0" dirty="0" err="1">
+                <a:solidFill>
+                  <a:srgbClr val="9CDCFE"/>
+                </a:solidFill>
+                <a:effectLst/>
+                <a:latin typeface="Consolas" panose="020B0609020204030204" pitchFamily="49" charset="0"/>
+              </a:rPr>
+              <a:t>compressed_image</a:t>
+            </a:r>
+            <a:r>
+              <a:rPr lang="es-ES" sz="1600" b="0" dirty="0">
+                <a:solidFill>
+                  <a:srgbClr val="CCCCCC"/>
+                </a:solidFill>
+                <a:effectLst/>
+                <a:latin typeface="Consolas" panose="020B0609020204030204" pitchFamily="49" charset="0"/>
+              </a:rPr>
+              <a:t> </a:t>
+            </a:r>
+            <a:r>
+              <a:rPr lang="es-ES" sz="1600" b="0" dirty="0">
+                <a:solidFill>
+                  <a:srgbClr val="D4D4D4"/>
+                </a:solidFill>
+                <a:effectLst/>
+                <a:latin typeface="Consolas" panose="020B0609020204030204" pitchFamily="49" charset="0"/>
+              </a:rPr>
+              <a:t>=</a:t>
+            </a:r>
+            <a:r>
+              <a:rPr lang="es-ES" sz="1600" b="0" dirty="0">
+                <a:solidFill>
+                  <a:srgbClr val="CCCCCC"/>
+                </a:solidFill>
+                <a:effectLst/>
+                <a:latin typeface="Consolas" panose="020B0609020204030204" pitchFamily="49" charset="0"/>
+              </a:rPr>
+              <a:t> </a:t>
+            </a:r>
+            <a:r>
+              <a:rPr lang="es-ES" sz="1600" b="0" dirty="0" err="1">
+                <a:solidFill>
+                  <a:srgbClr val="DCDCAA"/>
+                </a:solidFill>
+                <a:effectLst/>
+                <a:latin typeface="Consolas" panose="020B0609020204030204" pitchFamily="49" charset="0"/>
+              </a:rPr>
+              <a:t>compress_image</a:t>
+            </a:r>
+            <a:r>
+              <a:rPr lang="es-ES" sz="1600" b="0" dirty="0">
+                <a:solidFill>
+                  <a:srgbClr val="CCCCCC"/>
+                </a:solidFill>
+                <a:effectLst/>
+                <a:latin typeface="Consolas" panose="020B0609020204030204" pitchFamily="49" charset="0"/>
+              </a:rPr>
+              <a:t>(</a:t>
+            </a:r>
+            <a:r>
+              <a:rPr lang="es-ES" sz="1600" b="0" dirty="0" err="1">
+                <a:solidFill>
+                  <a:srgbClr val="9CDCFE"/>
+                </a:solidFill>
+                <a:effectLst/>
+                <a:latin typeface="Consolas" panose="020B0609020204030204" pitchFamily="49" charset="0"/>
+              </a:rPr>
+              <a:t>image_path</a:t>
+            </a:r>
+            <a:r>
+              <a:rPr lang="es-ES" sz="1600" b="0" dirty="0">
+                <a:solidFill>
+                  <a:srgbClr val="CCCCCC"/>
+                </a:solidFill>
+                <a:effectLst/>
+                <a:latin typeface="Consolas" panose="020B0609020204030204" pitchFamily="49" charset="0"/>
+              </a:rPr>
+              <a:t>, </a:t>
+            </a:r>
+            <a:r>
+              <a:rPr lang="es-ES" sz="1600" b="0" dirty="0" err="1">
+                <a:solidFill>
+                  <a:srgbClr val="9CDCFE"/>
+                </a:solidFill>
+                <a:effectLst/>
+                <a:latin typeface="Consolas" panose="020B0609020204030204" pitchFamily="49" charset="0"/>
+              </a:rPr>
+              <a:t>wavelet_family</a:t>
+            </a:r>
+            <a:r>
+              <a:rPr lang="es-ES" sz="1600" b="0" dirty="0">
+                <a:solidFill>
+                  <a:srgbClr val="CCCCCC"/>
+                </a:solidFill>
+                <a:effectLst/>
+                <a:latin typeface="Consolas" panose="020B0609020204030204" pitchFamily="49" charset="0"/>
+              </a:rPr>
+              <a:t>)</a:t>
+            </a:r>
+          </a:p>
+          <a:p>
+            <a:r>
+              <a:rPr lang="es-ES" sz="1600" b="0" dirty="0" err="1">
+                <a:solidFill>
+                  <a:srgbClr val="9CDCFE"/>
+                </a:solidFill>
+                <a:effectLst/>
+                <a:latin typeface="Consolas" panose="020B0609020204030204" pitchFamily="49" charset="0"/>
+              </a:rPr>
+              <a:t>compressed_image</a:t>
+            </a:r>
+            <a:r>
+              <a:rPr lang="es-ES" sz="1600" b="0" dirty="0" err="1">
+                <a:solidFill>
+                  <a:srgbClr val="CCCCCC"/>
+                </a:solidFill>
+                <a:effectLst/>
+                <a:latin typeface="Consolas" panose="020B0609020204030204" pitchFamily="49" charset="0"/>
+              </a:rPr>
+              <a:t>.</a:t>
+            </a:r>
+            <a:r>
+              <a:rPr lang="es-ES" sz="1600" b="0" dirty="0" err="1">
+                <a:solidFill>
+                  <a:srgbClr val="DCDCAA"/>
+                </a:solidFill>
+                <a:effectLst/>
+                <a:latin typeface="Consolas" panose="020B0609020204030204" pitchFamily="49" charset="0"/>
+              </a:rPr>
+              <a:t>show</a:t>
+            </a:r>
+            <a:r>
+              <a:rPr lang="es-ES" sz="1600" b="0" dirty="0">
+                <a:solidFill>
+                  <a:srgbClr val="CCCCCC"/>
+                </a:solidFill>
+                <a:effectLst/>
+                <a:latin typeface="Consolas" panose="020B0609020204030204" pitchFamily="49" charset="0"/>
+              </a:rPr>
+              <a:t>()</a:t>
+            </a:r>
+          </a:p>
+          <a:p>
+            <a:r>
+              <a:rPr lang="es-ES" sz="1600" b="0" dirty="0" err="1">
+                <a:solidFill>
+                  <a:srgbClr val="9CDCFE"/>
+                </a:solidFill>
+                <a:effectLst/>
+                <a:latin typeface="Consolas" panose="020B0609020204030204" pitchFamily="49" charset="0"/>
+              </a:rPr>
+              <a:t>compressed_image</a:t>
+            </a:r>
+            <a:r>
+              <a:rPr lang="es-ES" sz="1600" b="0" dirty="0" err="1">
+                <a:solidFill>
+                  <a:srgbClr val="CCCCCC"/>
+                </a:solidFill>
+                <a:effectLst/>
+                <a:latin typeface="Consolas" panose="020B0609020204030204" pitchFamily="49" charset="0"/>
+              </a:rPr>
+              <a:t>.</a:t>
+            </a:r>
+            <a:r>
+              <a:rPr lang="es-ES" sz="1600" b="0" dirty="0" err="1">
+                <a:solidFill>
+                  <a:srgbClr val="DCDCAA"/>
+                </a:solidFill>
+                <a:effectLst/>
+                <a:latin typeface="Consolas" panose="020B0609020204030204" pitchFamily="49" charset="0"/>
+              </a:rPr>
+              <a:t>save</a:t>
+            </a:r>
+            <a:r>
+              <a:rPr lang="es-ES" sz="1600" b="0" dirty="0">
+                <a:solidFill>
+                  <a:srgbClr val="CCCCCC"/>
+                </a:solidFill>
+                <a:effectLst/>
+                <a:latin typeface="Consolas" panose="020B0609020204030204" pitchFamily="49" charset="0"/>
+              </a:rPr>
+              <a:t>(</a:t>
+            </a:r>
+            <a:r>
+              <a:rPr lang="es-ES" sz="1600" b="0" dirty="0">
+                <a:solidFill>
+                  <a:srgbClr val="CE9178"/>
+                </a:solidFill>
+                <a:effectLst/>
+                <a:latin typeface="Consolas" panose="020B0609020204030204" pitchFamily="49" charset="0"/>
+              </a:rPr>
+              <a:t>"./data/</a:t>
+            </a:r>
+            <a:r>
+              <a:rPr lang="es-ES" sz="1600" b="0" dirty="0" err="1">
+                <a:solidFill>
+                  <a:srgbClr val="CE9178"/>
+                </a:solidFill>
+                <a:effectLst/>
+                <a:latin typeface="Consolas" panose="020B0609020204030204" pitchFamily="49" charset="0"/>
+              </a:rPr>
+              <a:t>Lena_comp_haar.png"</a:t>
+            </a:r>
+            <a:r>
+              <a:rPr lang="es-ES" sz="1600" b="0" dirty="0" err="1">
+                <a:solidFill>
+                  <a:srgbClr val="CCCCCC"/>
+                </a:solidFill>
+                <a:effectLst/>
+                <a:latin typeface="Consolas" panose="020B0609020204030204" pitchFamily="49" charset="0"/>
+              </a:rPr>
+              <a:t>,</a:t>
+            </a:r>
+            <a:r>
+              <a:rPr lang="es-ES" sz="1600" b="0" dirty="0" err="1">
+                <a:solidFill>
+                  <a:srgbClr val="CE9178"/>
+                </a:solidFill>
+                <a:effectLst/>
+                <a:latin typeface="Consolas" panose="020B0609020204030204" pitchFamily="49" charset="0"/>
+              </a:rPr>
+              <a:t>"PNG</a:t>
+            </a:r>
+            <a:r>
+              <a:rPr lang="es-ES" sz="1600" b="0" dirty="0">
+                <a:solidFill>
+                  <a:srgbClr val="CE9178"/>
+                </a:solidFill>
+                <a:effectLst/>
+                <a:latin typeface="Consolas" panose="020B0609020204030204" pitchFamily="49" charset="0"/>
+              </a:rPr>
+              <a:t>"</a:t>
+            </a:r>
+            <a:r>
+              <a:rPr lang="es-ES" sz="1600" b="0" dirty="0">
+                <a:solidFill>
+                  <a:srgbClr val="CCCCCC"/>
+                </a:solidFill>
+                <a:effectLst/>
+                <a:latin typeface="Consolas" panose="020B0609020204030204" pitchFamily="49" charset="0"/>
+              </a:rPr>
+              <a:t>)</a:t>
+            </a:r>
+          </a:p>
+        </p:txBody>
+      </p:sp>
+    </p:spTree>
+    <p:extLst>
+      <p:ext uri="{BB962C8B-B14F-4D97-AF65-F5344CB8AC3E}">
+        <p14:creationId xmlns:p14="http://schemas.microsoft.com/office/powerpoint/2010/main" val="2570479724"/>
+      </p:ext>
+    </p:extLst>
   </p:cSld>
   <p:clrMapOvr>
     <a:masterClrMapping/>

</xml_diff>